<commit_message>
Added skeleton of Sprint 1 Presentation
Fleshed out the presentation by added the headers of additional topics.
</commit_message>
<xml_diff>
--- a/Presentations/Sprint01_ReviewMeeting.pptx
+++ b/Presentations/Sprint01_ReviewMeeting.pptx
@@ -5,15 +5,32 @@
     <p:sldMasterId id="2147483648" r:id="rId1"/>
   </p:sldMasterIdLst>
   <p:notesMasterIdLst>
-    <p:notesMasterId r:id="rId8"/>
+    <p:notesMasterId r:id="rId25"/>
   </p:notesMasterIdLst>
   <p:sldIdLst>
     <p:sldId id="256" r:id="rId2"/>
     <p:sldId id="257" r:id="rId3"/>
-    <p:sldId id="258" r:id="rId4"/>
-    <p:sldId id="260" r:id="rId5"/>
-    <p:sldId id="259" r:id="rId6"/>
-    <p:sldId id="261" r:id="rId7"/>
+    <p:sldId id="263" r:id="rId4"/>
+    <p:sldId id="271" r:id="rId5"/>
+    <p:sldId id="261" r:id="rId6"/>
+    <p:sldId id="258" r:id="rId7"/>
+    <p:sldId id="260" r:id="rId8"/>
+    <p:sldId id="259" r:id="rId9"/>
+    <p:sldId id="272" r:id="rId10"/>
+    <p:sldId id="262" r:id="rId11"/>
+    <p:sldId id="264" r:id="rId12"/>
+    <p:sldId id="274" r:id="rId13"/>
+    <p:sldId id="265" r:id="rId14"/>
+    <p:sldId id="275" r:id="rId15"/>
+    <p:sldId id="266" r:id="rId16"/>
+    <p:sldId id="276" r:id="rId17"/>
+    <p:sldId id="269" r:id="rId18"/>
+    <p:sldId id="270" r:id="rId19"/>
+    <p:sldId id="267" r:id="rId20"/>
+    <p:sldId id="277" r:id="rId21"/>
+    <p:sldId id="268" r:id="rId22"/>
+    <p:sldId id="273" r:id="rId23"/>
+    <p:sldId id="278" r:id="rId24"/>
   </p:sldIdLst>
   <p:sldSz cx="12192000" cy="6858000"/>
   <p:notesSz cx="6858000" cy="9144000"/>
@@ -119,16 +136,70 @@
           <p14:sldIdLst>
             <p14:sldId id="256"/>
             <p14:sldId id="257"/>
+            <p14:sldId id="263"/>
+            <p14:sldId id="271"/>
+            <p14:sldId id="261"/>
             <p14:sldId id="258"/>
             <p14:sldId id="260"/>
             <p14:sldId id="259"/>
-            <p14:sldId id="261"/>
+            <p14:sldId id="272"/>
+            <p14:sldId id="262"/>
+            <p14:sldId id="264"/>
+            <p14:sldId id="274"/>
+            <p14:sldId id="265"/>
+            <p14:sldId id="275"/>
+            <p14:sldId id="266"/>
+            <p14:sldId id="276"/>
+            <p14:sldId id="269"/>
+            <p14:sldId id="270"/>
+            <p14:sldId id="267"/>
+            <p14:sldId id="277"/>
+            <p14:sldId id="268"/>
+            <p14:sldId id="273"/>
+            <p14:sldId id="278"/>
           </p14:sldIdLst>
         </p14:section>
       </p14:sectionLst>
     </p:ext>
   </p:extLst>
 </p:presentation>
+</file>
+
+<file path=ppt/commentAuthors.xml><?xml version="1.0" encoding="utf-8"?>
+<p:cmAuthorLst xmlns:a="http://schemas.openxmlformats.org/drawingml/2006/main" xmlns:r="http://schemas.openxmlformats.org/officeDocument/2006/relationships" xmlns:p="http://schemas.openxmlformats.org/presentationml/2006/main">
+  <p:cmAuthor id="1" name="Logan Francisco" initials="LF" lastIdx="2" clrIdx="0">
+    <p:extLst>
+      <p:ext uri="{19B8F6BF-5375-455C-9EA6-DF929625EA0E}">
+        <p15:presenceInfo xmlns:p15="http://schemas.microsoft.com/office/powerpoint/2012/main" userId="b17b329bd78fe238" providerId="Windows Live"/>
+      </p:ext>
+    </p:extLst>
+  </p:cmAuthor>
+</p:cmAuthorLst>
+</file>
+
+<file path=ppt/comments/comment1.xml><?xml version="1.0" encoding="utf-8"?>
+<p:cmLst xmlns:a="http://schemas.openxmlformats.org/drawingml/2006/main" xmlns:r="http://schemas.openxmlformats.org/officeDocument/2006/relationships" xmlns:p="http://schemas.openxmlformats.org/presentationml/2006/main">
+  <p:cm authorId="1" dt="2018-11-26T20:34:52.931" idx="1">
+    <p:pos x="10" y="10"/>
+    <p:text>Should we even have this? I say be 100% honest, but if I'm the only one who wants this, we don't have to have it.</p:text>
+    <p:extLst>
+      <p:ext uri="{C676402C-5697-4E1C-873F-D02D1690AC5C}">
+        <p15:threadingInfo xmlns:p15="http://schemas.microsoft.com/office/powerpoint/2012/main" timeZoneBias="480"/>
+      </p:ext>
+    </p:extLst>
+  </p:cm>
+  <p:cm authorId="1" dt="2018-11-26T20:35:25.583" idx="2">
+    <p:pos x="10" y="106"/>
+    <p:text>If so, where should we put it?</p:text>
+    <p:extLst>
+      <p:ext uri="{C676402C-5697-4E1C-873F-D02D1690AC5C}">
+        <p15:threadingInfo xmlns:p15="http://schemas.microsoft.com/office/powerpoint/2012/main" timeZoneBias="480">
+          <p15:parentCm authorId="1" idx="1"/>
+        </p15:threadingInfo>
+      </p:ext>
+    </p:extLst>
+  </p:cm>
+</p:cmLst>
 </file>
 
 <file path=ppt/notesMasters/notesMaster1.xml><?xml version="1.0" encoding="utf-8"?>
@@ -8073,6 +8144,1155 @@
 </p:sld>
 </file>
 
+<file path=ppt/slides/slide10.xml><?xml version="1.0" encoding="utf-8"?>
+<p:sld xmlns:a="http://schemas.openxmlformats.org/drawingml/2006/main" xmlns:r="http://schemas.openxmlformats.org/officeDocument/2006/relationships" xmlns:p="http://schemas.openxmlformats.org/presentationml/2006/main">
+  <p:cSld>
+    <p:spTree>
+      <p:nvGrpSpPr>
+        <p:cNvPr id="1" name=""/>
+        <p:cNvGrpSpPr/>
+        <p:nvPr/>
+      </p:nvGrpSpPr>
+      <p:grpSpPr>
+        <a:xfrm>
+          <a:off x="0" y="0"/>
+          <a:ext cx="0" cy="0"/>
+          <a:chOff x="0" y="0"/>
+          <a:chExt cx="0" cy="0"/>
+        </a:xfrm>
+      </p:grpSpPr>
+      <p:sp>
+        <p:nvSpPr>
+          <p:cNvPr id="2" name="Title 1">
+            <a:extLst>
+              <a:ext uri="{FF2B5EF4-FFF2-40B4-BE49-F238E27FC236}">
+                <a16:creationId xmlns:a16="http://schemas.microsoft.com/office/drawing/2014/main" id="{499DD049-749B-4076-B464-014F8ADDE19C}"/>
+              </a:ext>
+            </a:extLst>
+          </p:cNvPr>
+          <p:cNvSpPr>
+            <a:spLocks noGrp="1"/>
+          </p:cNvSpPr>
+          <p:nvPr>
+            <p:ph type="title"/>
+          </p:nvPr>
+        </p:nvSpPr>
+        <p:spPr/>
+        <p:txBody>
+          <a:bodyPr/>
+          <a:lstStyle/>
+          <a:p>
+            <a:r>
+              <a:rPr lang="en-US" dirty="0"/>
+              <a:t>Flawed Beginning</a:t>
+            </a:r>
+          </a:p>
+        </p:txBody>
+      </p:sp>
+      <p:sp>
+        <p:nvSpPr>
+          <p:cNvPr id="3" name="Content Placeholder 2">
+            <a:extLst>
+              <a:ext uri="{FF2B5EF4-FFF2-40B4-BE49-F238E27FC236}">
+                <a16:creationId xmlns:a16="http://schemas.microsoft.com/office/drawing/2014/main" id="{01E73AF8-E079-4E3C-B6BD-0E836196367F}"/>
+              </a:ext>
+            </a:extLst>
+          </p:cNvPr>
+          <p:cNvSpPr>
+            <a:spLocks noGrp="1"/>
+          </p:cNvSpPr>
+          <p:nvPr>
+            <p:ph idx="1"/>
+          </p:nvPr>
+        </p:nvSpPr>
+        <p:spPr/>
+        <p:txBody>
+          <a:bodyPr/>
+          <a:lstStyle/>
+          <a:p>
+            <a:r>
+              <a:rPr lang="en-US" dirty="0"/>
+              <a:t>Attempted to dive into project without more design work.</a:t>
+            </a:r>
+          </a:p>
+          <a:p>
+            <a:r>
+              <a:rPr lang="en-US" dirty="0"/>
+              <a:t>Refocus at 1.5-2 weeks into sprint</a:t>
+            </a:r>
+          </a:p>
+          <a:p>
+            <a:r>
+              <a:rPr lang="en-US" dirty="0"/>
+              <a:t>Result: Threw out some work.</a:t>
+            </a:r>
+          </a:p>
+        </p:txBody>
+      </p:sp>
+      <p:sp>
+        <p:nvSpPr>
+          <p:cNvPr id="4" name="Slide Number Placeholder 3">
+            <a:extLst>
+              <a:ext uri="{FF2B5EF4-FFF2-40B4-BE49-F238E27FC236}">
+                <a16:creationId xmlns:a16="http://schemas.microsoft.com/office/drawing/2014/main" id="{F641D3F2-75C5-40F6-80C4-E394B00EBE2F}"/>
+              </a:ext>
+            </a:extLst>
+          </p:cNvPr>
+          <p:cNvSpPr>
+            <a:spLocks noGrp="1"/>
+          </p:cNvSpPr>
+          <p:nvPr>
+            <p:ph type="sldNum" sz="quarter" idx="12"/>
+          </p:nvPr>
+        </p:nvSpPr>
+        <p:spPr/>
+        <p:txBody>
+          <a:bodyPr/>
+          <a:lstStyle/>
+          <a:p>
+            <a:fld id="{D57F1E4F-1CFF-5643-939E-217C01CDF565}" type="slidenum">
+              <a:rPr lang="en-US" smtClean="0"/>
+              <a:pPr/>
+              <a:t>10</a:t>
+            </a:fld>
+            <a:endParaRPr lang="en-US" dirty="0"/>
+          </a:p>
+        </p:txBody>
+      </p:sp>
+    </p:spTree>
+    <p:extLst>
+      <p:ext uri="{BB962C8B-B14F-4D97-AF65-F5344CB8AC3E}">
+        <p14:creationId xmlns:p14="http://schemas.microsoft.com/office/powerpoint/2010/main" val="1137686007"/>
+      </p:ext>
+    </p:extLst>
+  </p:cSld>
+  <p:clrMapOvr>
+    <a:masterClrMapping/>
+  </p:clrMapOvr>
+</p:sld>
+</file>
+
+<file path=ppt/slides/slide11.xml><?xml version="1.0" encoding="utf-8"?>
+<p:sld xmlns:a="http://schemas.openxmlformats.org/drawingml/2006/main" xmlns:r="http://schemas.openxmlformats.org/officeDocument/2006/relationships" xmlns:p="http://schemas.openxmlformats.org/presentationml/2006/main">
+  <p:cSld>
+    <p:spTree>
+      <p:nvGrpSpPr>
+        <p:cNvPr id="1" name=""/>
+        <p:cNvGrpSpPr/>
+        <p:nvPr/>
+      </p:nvGrpSpPr>
+      <p:grpSpPr>
+        <a:xfrm>
+          <a:off x="0" y="0"/>
+          <a:ext cx="0" cy="0"/>
+          <a:chOff x="0" y="0"/>
+          <a:chExt cx="0" cy="0"/>
+        </a:xfrm>
+      </p:grpSpPr>
+      <p:sp>
+        <p:nvSpPr>
+          <p:cNvPr id="2" name="Title 1">
+            <a:extLst>
+              <a:ext uri="{FF2B5EF4-FFF2-40B4-BE49-F238E27FC236}">
+                <a16:creationId xmlns:a16="http://schemas.microsoft.com/office/drawing/2014/main" id="{E7B8949F-0B31-4A8B-88CD-BCF7FDCCDC8C}"/>
+              </a:ext>
+            </a:extLst>
+          </p:cNvPr>
+          <p:cNvSpPr>
+            <a:spLocks noGrp="1"/>
+          </p:cNvSpPr>
+          <p:nvPr>
+            <p:ph type="title"/>
+          </p:nvPr>
+        </p:nvSpPr>
+        <p:spPr/>
+        <p:txBody>
+          <a:bodyPr/>
+          <a:lstStyle/>
+          <a:p>
+            <a:r>
+              <a:rPr lang="en-US" dirty="0"/>
+              <a:t>UML Design</a:t>
+            </a:r>
+          </a:p>
+        </p:txBody>
+      </p:sp>
+      <p:sp>
+        <p:nvSpPr>
+          <p:cNvPr id="3" name="Content Placeholder 2">
+            <a:extLst>
+              <a:ext uri="{FF2B5EF4-FFF2-40B4-BE49-F238E27FC236}">
+                <a16:creationId xmlns:a16="http://schemas.microsoft.com/office/drawing/2014/main" id="{5018D8C8-31EA-4094-A891-253AAD5D26D8}"/>
+              </a:ext>
+            </a:extLst>
+          </p:cNvPr>
+          <p:cNvSpPr>
+            <a:spLocks noGrp="1"/>
+          </p:cNvSpPr>
+          <p:nvPr>
+            <p:ph idx="1"/>
+          </p:nvPr>
+        </p:nvSpPr>
+        <p:spPr/>
+        <p:txBody>
+          <a:bodyPr/>
+          <a:lstStyle/>
+          <a:p>
+            <a:endParaRPr lang="en-US" dirty="0"/>
+          </a:p>
+        </p:txBody>
+      </p:sp>
+      <p:sp>
+        <p:nvSpPr>
+          <p:cNvPr id="4" name="Slide Number Placeholder 3">
+            <a:extLst>
+              <a:ext uri="{FF2B5EF4-FFF2-40B4-BE49-F238E27FC236}">
+                <a16:creationId xmlns:a16="http://schemas.microsoft.com/office/drawing/2014/main" id="{7DEE7B36-887B-4747-AD42-46A4BE37CE1D}"/>
+              </a:ext>
+            </a:extLst>
+          </p:cNvPr>
+          <p:cNvSpPr>
+            <a:spLocks noGrp="1"/>
+          </p:cNvSpPr>
+          <p:nvPr>
+            <p:ph type="sldNum" sz="quarter" idx="12"/>
+          </p:nvPr>
+        </p:nvSpPr>
+        <p:spPr/>
+        <p:txBody>
+          <a:bodyPr/>
+          <a:lstStyle/>
+          <a:p>
+            <a:fld id="{D57F1E4F-1CFF-5643-939E-217C01CDF565}" type="slidenum">
+              <a:rPr lang="en-US" smtClean="0"/>
+              <a:pPr/>
+              <a:t>11</a:t>
+            </a:fld>
+            <a:endParaRPr lang="en-US" dirty="0"/>
+          </a:p>
+        </p:txBody>
+      </p:sp>
+    </p:spTree>
+    <p:extLst>
+      <p:ext uri="{BB962C8B-B14F-4D97-AF65-F5344CB8AC3E}">
+        <p14:creationId xmlns:p14="http://schemas.microsoft.com/office/powerpoint/2010/main" val="3926891289"/>
+      </p:ext>
+    </p:extLst>
+  </p:cSld>
+  <p:clrMapOvr>
+    <a:masterClrMapping/>
+  </p:clrMapOvr>
+</p:sld>
+</file>
+
+<file path=ppt/slides/slide12.xml><?xml version="1.0" encoding="utf-8"?>
+<p:sld xmlns:a="http://schemas.openxmlformats.org/drawingml/2006/main" xmlns:r="http://schemas.openxmlformats.org/officeDocument/2006/relationships" xmlns:p="http://schemas.openxmlformats.org/presentationml/2006/main">
+  <p:cSld>
+    <p:spTree>
+      <p:nvGrpSpPr>
+        <p:cNvPr id="1" name=""/>
+        <p:cNvGrpSpPr/>
+        <p:nvPr/>
+      </p:nvGrpSpPr>
+      <p:grpSpPr>
+        <a:xfrm>
+          <a:off x="0" y="0"/>
+          <a:ext cx="0" cy="0"/>
+          <a:chOff x="0" y="0"/>
+          <a:chExt cx="0" cy="0"/>
+        </a:xfrm>
+      </p:grpSpPr>
+      <p:sp>
+        <p:nvSpPr>
+          <p:cNvPr id="2" name="Title 1">
+            <a:extLst>
+              <a:ext uri="{FF2B5EF4-FFF2-40B4-BE49-F238E27FC236}">
+                <a16:creationId xmlns:a16="http://schemas.microsoft.com/office/drawing/2014/main" id="{CF6EE8FB-D3EC-4DF0-BE35-2EAA1E9F1208}"/>
+              </a:ext>
+            </a:extLst>
+          </p:cNvPr>
+          <p:cNvSpPr>
+            <a:spLocks noGrp="1"/>
+          </p:cNvSpPr>
+          <p:nvPr>
+            <p:ph type="title"/>
+          </p:nvPr>
+        </p:nvSpPr>
+        <p:spPr/>
+        <p:txBody>
+          <a:bodyPr/>
+          <a:lstStyle/>
+          <a:p>
+            <a:r>
+              <a:rPr lang="en-US" dirty="0"/>
+              <a:t>Questions?</a:t>
+            </a:r>
+          </a:p>
+        </p:txBody>
+      </p:sp>
+      <p:sp>
+        <p:nvSpPr>
+          <p:cNvPr id="3" name="Content Placeholder 2">
+            <a:extLst>
+              <a:ext uri="{FF2B5EF4-FFF2-40B4-BE49-F238E27FC236}">
+                <a16:creationId xmlns:a16="http://schemas.microsoft.com/office/drawing/2014/main" id="{65B46963-A67E-46F8-8ACF-E50284148EC5}"/>
+              </a:ext>
+            </a:extLst>
+          </p:cNvPr>
+          <p:cNvSpPr>
+            <a:spLocks noGrp="1"/>
+          </p:cNvSpPr>
+          <p:nvPr>
+            <p:ph idx="1"/>
+          </p:nvPr>
+        </p:nvSpPr>
+        <p:spPr/>
+        <p:txBody>
+          <a:bodyPr/>
+          <a:lstStyle/>
+          <a:p>
+            <a:endParaRPr lang="en-US"/>
+          </a:p>
+        </p:txBody>
+      </p:sp>
+      <p:sp>
+        <p:nvSpPr>
+          <p:cNvPr id="4" name="Slide Number Placeholder 3">
+            <a:extLst>
+              <a:ext uri="{FF2B5EF4-FFF2-40B4-BE49-F238E27FC236}">
+                <a16:creationId xmlns:a16="http://schemas.microsoft.com/office/drawing/2014/main" id="{4FAAFCB4-B201-4C0B-A29A-0D298A2342C1}"/>
+              </a:ext>
+            </a:extLst>
+          </p:cNvPr>
+          <p:cNvSpPr>
+            <a:spLocks noGrp="1"/>
+          </p:cNvSpPr>
+          <p:nvPr>
+            <p:ph type="sldNum" sz="quarter" idx="12"/>
+          </p:nvPr>
+        </p:nvSpPr>
+        <p:spPr/>
+        <p:txBody>
+          <a:bodyPr/>
+          <a:lstStyle/>
+          <a:p>
+            <a:fld id="{D57F1E4F-1CFF-5643-939E-217C01CDF565}" type="slidenum">
+              <a:rPr lang="en-US" smtClean="0"/>
+              <a:pPr/>
+              <a:t>12</a:t>
+            </a:fld>
+            <a:endParaRPr lang="en-US" dirty="0"/>
+          </a:p>
+        </p:txBody>
+      </p:sp>
+    </p:spTree>
+    <p:extLst>
+      <p:ext uri="{BB962C8B-B14F-4D97-AF65-F5344CB8AC3E}">
+        <p14:creationId xmlns:p14="http://schemas.microsoft.com/office/powerpoint/2010/main" val="4159735860"/>
+      </p:ext>
+    </p:extLst>
+  </p:cSld>
+  <p:clrMapOvr>
+    <a:masterClrMapping/>
+  </p:clrMapOvr>
+</p:sld>
+</file>
+
+<file path=ppt/slides/slide13.xml><?xml version="1.0" encoding="utf-8"?>
+<p:sld xmlns:a="http://schemas.openxmlformats.org/drawingml/2006/main" xmlns:r="http://schemas.openxmlformats.org/officeDocument/2006/relationships" xmlns:p="http://schemas.openxmlformats.org/presentationml/2006/main">
+  <p:cSld>
+    <p:spTree>
+      <p:nvGrpSpPr>
+        <p:cNvPr id="1" name=""/>
+        <p:cNvGrpSpPr/>
+        <p:nvPr/>
+      </p:nvGrpSpPr>
+      <p:grpSpPr>
+        <a:xfrm>
+          <a:off x="0" y="0"/>
+          <a:ext cx="0" cy="0"/>
+          <a:chOff x="0" y="0"/>
+          <a:chExt cx="0" cy="0"/>
+        </a:xfrm>
+      </p:grpSpPr>
+      <p:sp>
+        <p:nvSpPr>
+          <p:cNvPr id="2" name="Title 1">
+            <a:extLst>
+              <a:ext uri="{FF2B5EF4-FFF2-40B4-BE49-F238E27FC236}">
+                <a16:creationId xmlns:a16="http://schemas.microsoft.com/office/drawing/2014/main" id="{E2708479-A9AB-4BF8-A44B-937AE89AEBFF}"/>
+              </a:ext>
+            </a:extLst>
+          </p:cNvPr>
+          <p:cNvSpPr>
+            <a:spLocks noGrp="1"/>
+          </p:cNvSpPr>
+          <p:nvPr>
+            <p:ph type="title"/>
+          </p:nvPr>
+        </p:nvSpPr>
+        <p:spPr/>
+        <p:txBody>
+          <a:bodyPr/>
+          <a:lstStyle/>
+          <a:p>
+            <a:r>
+              <a:rPr lang="en-US" dirty="0"/>
+              <a:t>GUI Design</a:t>
+            </a:r>
+          </a:p>
+        </p:txBody>
+      </p:sp>
+      <p:sp>
+        <p:nvSpPr>
+          <p:cNvPr id="3" name="Content Placeholder 2">
+            <a:extLst>
+              <a:ext uri="{FF2B5EF4-FFF2-40B4-BE49-F238E27FC236}">
+                <a16:creationId xmlns:a16="http://schemas.microsoft.com/office/drawing/2014/main" id="{9B55791B-E2AF-4809-A81A-750947D90409}"/>
+              </a:ext>
+            </a:extLst>
+          </p:cNvPr>
+          <p:cNvSpPr>
+            <a:spLocks noGrp="1"/>
+          </p:cNvSpPr>
+          <p:nvPr>
+            <p:ph idx="1"/>
+          </p:nvPr>
+        </p:nvSpPr>
+        <p:spPr/>
+        <p:txBody>
+          <a:bodyPr/>
+          <a:lstStyle/>
+          <a:p>
+            <a:endParaRPr lang="en-US"/>
+          </a:p>
+        </p:txBody>
+      </p:sp>
+      <p:sp>
+        <p:nvSpPr>
+          <p:cNvPr id="4" name="Slide Number Placeholder 3">
+            <a:extLst>
+              <a:ext uri="{FF2B5EF4-FFF2-40B4-BE49-F238E27FC236}">
+                <a16:creationId xmlns:a16="http://schemas.microsoft.com/office/drawing/2014/main" id="{25F31333-FA60-4DDE-860A-723484BDC712}"/>
+              </a:ext>
+            </a:extLst>
+          </p:cNvPr>
+          <p:cNvSpPr>
+            <a:spLocks noGrp="1"/>
+          </p:cNvSpPr>
+          <p:nvPr>
+            <p:ph type="sldNum" sz="quarter" idx="12"/>
+          </p:nvPr>
+        </p:nvSpPr>
+        <p:spPr/>
+        <p:txBody>
+          <a:bodyPr/>
+          <a:lstStyle/>
+          <a:p>
+            <a:fld id="{D57F1E4F-1CFF-5643-939E-217C01CDF565}" type="slidenum">
+              <a:rPr lang="en-US" smtClean="0"/>
+              <a:pPr/>
+              <a:t>13</a:t>
+            </a:fld>
+            <a:endParaRPr lang="en-US" dirty="0"/>
+          </a:p>
+        </p:txBody>
+      </p:sp>
+    </p:spTree>
+    <p:extLst>
+      <p:ext uri="{BB962C8B-B14F-4D97-AF65-F5344CB8AC3E}">
+        <p14:creationId xmlns:p14="http://schemas.microsoft.com/office/powerpoint/2010/main" val="1840288446"/>
+      </p:ext>
+    </p:extLst>
+  </p:cSld>
+  <p:clrMapOvr>
+    <a:masterClrMapping/>
+  </p:clrMapOvr>
+</p:sld>
+</file>
+
+<file path=ppt/slides/slide14.xml><?xml version="1.0" encoding="utf-8"?>
+<p:sld xmlns:a="http://schemas.openxmlformats.org/drawingml/2006/main" xmlns:r="http://schemas.openxmlformats.org/officeDocument/2006/relationships" xmlns:p="http://schemas.openxmlformats.org/presentationml/2006/main">
+  <p:cSld>
+    <p:spTree>
+      <p:nvGrpSpPr>
+        <p:cNvPr id="1" name=""/>
+        <p:cNvGrpSpPr/>
+        <p:nvPr/>
+      </p:nvGrpSpPr>
+      <p:grpSpPr>
+        <a:xfrm>
+          <a:off x="0" y="0"/>
+          <a:ext cx="0" cy="0"/>
+          <a:chOff x="0" y="0"/>
+          <a:chExt cx="0" cy="0"/>
+        </a:xfrm>
+      </p:grpSpPr>
+      <p:sp>
+        <p:nvSpPr>
+          <p:cNvPr id="2" name="Title 1">
+            <a:extLst>
+              <a:ext uri="{FF2B5EF4-FFF2-40B4-BE49-F238E27FC236}">
+                <a16:creationId xmlns:a16="http://schemas.microsoft.com/office/drawing/2014/main" id="{D96EBD93-1E0F-4715-BA1C-4AB9A43FEEDE}"/>
+              </a:ext>
+            </a:extLst>
+          </p:cNvPr>
+          <p:cNvSpPr>
+            <a:spLocks noGrp="1"/>
+          </p:cNvSpPr>
+          <p:nvPr>
+            <p:ph type="title"/>
+          </p:nvPr>
+        </p:nvSpPr>
+        <p:spPr/>
+        <p:txBody>
+          <a:bodyPr/>
+          <a:lstStyle/>
+          <a:p>
+            <a:r>
+              <a:rPr lang="en-US" dirty="0"/>
+              <a:t>Questions?</a:t>
+            </a:r>
+          </a:p>
+        </p:txBody>
+      </p:sp>
+      <p:sp>
+        <p:nvSpPr>
+          <p:cNvPr id="3" name="Content Placeholder 2">
+            <a:extLst>
+              <a:ext uri="{FF2B5EF4-FFF2-40B4-BE49-F238E27FC236}">
+                <a16:creationId xmlns:a16="http://schemas.microsoft.com/office/drawing/2014/main" id="{1DAF5560-583E-4CB6-A740-F6B3808FA9A7}"/>
+              </a:ext>
+            </a:extLst>
+          </p:cNvPr>
+          <p:cNvSpPr>
+            <a:spLocks noGrp="1"/>
+          </p:cNvSpPr>
+          <p:nvPr>
+            <p:ph idx="1"/>
+          </p:nvPr>
+        </p:nvSpPr>
+        <p:spPr/>
+        <p:txBody>
+          <a:bodyPr/>
+          <a:lstStyle/>
+          <a:p>
+            <a:endParaRPr lang="en-US"/>
+          </a:p>
+        </p:txBody>
+      </p:sp>
+      <p:sp>
+        <p:nvSpPr>
+          <p:cNvPr id="4" name="Slide Number Placeholder 3">
+            <a:extLst>
+              <a:ext uri="{FF2B5EF4-FFF2-40B4-BE49-F238E27FC236}">
+                <a16:creationId xmlns:a16="http://schemas.microsoft.com/office/drawing/2014/main" id="{F2E49AE3-63D3-4DD3-818F-6E7B5C470582}"/>
+              </a:ext>
+            </a:extLst>
+          </p:cNvPr>
+          <p:cNvSpPr>
+            <a:spLocks noGrp="1"/>
+          </p:cNvSpPr>
+          <p:nvPr>
+            <p:ph type="sldNum" sz="quarter" idx="12"/>
+          </p:nvPr>
+        </p:nvSpPr>
+        <p:spPr/>
+        <p:txBody>
+          <a:bodyPr/>
+          <a:lstStyle/>
+          <a:p>
+            <a:fld id="{D57F1E4F-1CFF-5643-939E-217C01CDF565}" type="slidenum">
+              <a:rPr lang="en-US" smtClean="0"/>
+              <a:pPr/>
+              <a:t>14</a:t>
+            </a:fld>
+            <a:endParaRPr lang="en-US" dirty="0"/>
+          </a:p>
+        </p:txBody>
+      </p:sp>
+    </p:spTree>
+    <p:extLst>
+      <p:ext uri="{BB962C8B-B14F-4D97-AF65-F5344CB8AC3E}">
+        <p14:creationId xmlns:p14="http://schemas.microsoft.com/office/powerpoint/2010/main" val="1963745184"/>
+      </p:ext>
+    </p:extLst>
+  </p:cSld>
+  <p:clrMapOvr>
+    <a:masterClrMapping/>
+  </p:clrMapOvr>
+</p:sld>
+</file>
+
+<file path=ppt/slides/slide15.xml><?xml version="1.0" encoding="utf-8"?>
+<p:sld xmlns:a="http://schemas.openxmlformats.org/drawingml/2006/main" xmlns:r="http://schemas.openxmlformats.org/officeDocument/2006/relationships" xmlns:p="http://schemas.openxmlformats.org/presentationml/2006/main">
+  <p:cSld>
+    <p:spTree>
+      <p:nvGrpSpPr>
+        <p:cNvPr id="1" name=""/>
+        <p:cNvGrpSpPr/>
+        <p:nvPr/>
+      </p:nvGrpSpPr>
+      <p:grpSpPr>
+        <a:xfrm>
+          <a:off x="0" y="0"/>
+          <a:ext cx="0" cy="0"/>
+          <a:chOff x="0" y="0"/>
+          <a:chExt cx="0" cy="0"/>
+        </a:xfrm>
+      </p:grpSpPr>
+      <p:sp>
+        <p:nvSpPr>
+          <p:cNvPr id="2" name="Title 1">
+            <a:extLst>
+              <a:ext uri="{FF2B5EF4-FFF2-40B4-BE49-F238E27FC236}">
+                <a16:creationId xmlns:a16="http://schemas.microsoft.com/office/drawing/2014/main" id="{83DFF23D-959A-44BC-BE78-1D0330CDF164}"/>
+              </a:ext>
+            </a:extLst>
+          </p:cNvPr>
+          <p:cNvSpPr>
+            <a:spLocks noGrp="1"/>
+          </p:cNvSpPr>
+          <p:nvPr>
+            <p:ph type="title"/>
+          </p:nvPr>
+        </p:nvSpPr>
+        <p:spPr/>
+        <p:txBody>
+          <a:bodyPr/>
+          <a:lstStyle/>
+          <a:p>
+            <a:r>
+              <a:rPr lang="en-US" dirty="0"/>
+              <a:t>Algorithm</a:t>
+            </a:r>
+          </a:p>
+        </p:txBody>
+      </p:sp>
+      <p:sp>
+        <p:nvSpPr>
+          <p:cNvPr id="3" name="Content Placeholder 2">
+            <a:extLst>
+              <a:ext uri="{FF2B5EF4-FFF2-40B4-BE49-F238E27FC236}">
+                <a16:creationId xmlns:a16="http://schemas.microsoft.com/office/drawing/2014/main" id="{706A48C4-F2C9-48C7-B302-4ADE777DDB2E}"/>
+              </a:ext>
+            </a:extLst>
+          </p:cNvPr>
+          <p:cNvSpPr>
+            <a:spLocks noGrp="1"/>
+          </p:cNvSpPr>
+          <p:nvPr>
+            <p:ph idx="1"/>
+          </p:nvPr>
+        </p:nvSpPr>
+        <p:spPr/>
+        <p:txBody>
+          <a:bodyPr/>
+          <a:lstStyle/>
+          <a:p>
+            <a:endParaRPr lang="en-US"/>
+          </a:p>
+        </p:txBody>
+      </p:sp>
+      <p:sp>
+        <p:nvSpPr>
+          <p:cNvPr id="4" name="Slide Number Placeholder 3">
+            <a:extLst>
+              <a:ext uri="{FF2B5EF4-FFF2-40B4-BE49-F238E27FC236}">
+                <a16:creationId xmlns:a16="http://schemas.microsoft.com/office/drawing/2014/main" id="{8BA44F56-3ECD-42B0-A9A9-E5F99872401B}"/>
+              </a:ext>
+            </a:extLst>
+          </p:cNvPr>
+          <p:cNvSpPr>
+            <a:spLocks noGrp="1"/>
+          </p:cNvSpPr>
+          <p:nvPr>
+            <p:ph type="sldNum" sz="quarter" idx="12"/>
+          </p:nvPr>
+        </p:nvSpPr>
+        <p:spPr/>
+        <p:txBody>
+          <a:bodyPr/>
+          <a:lstStyle/>
+          <a:p>
+            <a:fld id="{D57F1E4F-1CFF-5643-939E-217C01CDF565}" type="slidenum">
+              <a:rPr lang="en-US" smtClean="0"/>
+              <a:pPr/>
+              <a:t>15</a:t>
+            </a:fld>
+            <a:endParaRPr lang="en-US" dirty="0"/>
+          </a:p>
+        </p:txBody>
+      </p:sp>
+    </p:spTree>
+    <p:extLst>
+      <p:ext uri="{BB962C8B-B14F-4D97-AF65-F5344CB8AC3E}">
+        <p14:creationId xmlns:p14="http://schemas.microsoft.com/office/powerpoint/2010/main" val="230190470"/>
+      </p:ext>
+    </p:extLst>
+  </p:cSld>
+  <p:clrMapOvr>
+    <a:masterClrMapping/>
+  </p:clrMapOvr>
+</p:sld>
+</file>
+
+<file path=ppt/slides/slide16.xml><?xml version="1.0" encoding="utf-8"?>
+<p:sld xmlns:a="http://schemas.openxmlformats.org/drawingml/2006/main" xmlns:r="http://schemas.openxmlformats.org/officeDocument/2006/relationships" xmlns:p="http://schemas.openxmlformats.org/presentationml/2006/main">
+  <p:cSld>
+    <p:spTree>
+      <p:nvGrpSpPr>
+        <p:cNvPr id="1" name=""/>
+        <p:cNvGrpSpPr/>
+        <p:nvPr/>
+      </p:nvGrpSpPr>
+      <p:grpSpPr>
+        <a:xfrm>
+          <a:off x="0" y="0"/>
+          <a:ext cx="0" cy="0"/>
+          <a:chOff x="0" y="0"/>
+          <a:chExt cx="0" cy="0"/>
+        </a:xfrm>
+      </p:grpSpPr>
+      <p:sp>
+        <p:nvSpPr>
+          <p:cNvPr id="2" name="Title 1">
+            <a:extLst>
+              <a:ext uri="{FF2B5EF4-FFF2-40B4-BE49-F238E27FC236}">
+                <a16:creationId xmlns:a16="http://schemas.microsoft.com/office/drawing/2014/main" id="{4E96F21E-1AFE-4A04-8BD0-C88D1D2DA52C}"/>
+              </a:ext>
+            </a:extLst>
+          </p:cNvPr>
+          <p:cNvSpPr>
+            <a:spLocks noGrp="1"/>
+          </p:cNvSpPr>
+          <p:nvPr>
+            <p:ph type="title"/>
+          </p:nvPr>
+        </p:nvSpPr>
+        <p:spPr/>
+        <p:txBody>
+          <a:bodyPr/>
+          <a:lstStyle/>
+          <a:p>
+            <a:r>
+              <a:rPr lang="en-US" dirty="0"/>
+              <a:t>Questions?</a:t>
+            </a:r>
+          </a:p>
+        </p:txBody>
+      </p:sp>
+      <p:sp>
+        <p:nvSpPr>
+          <p:cNvPr id="3" name="Content Placeholder 2">
+            <a:extLst>
+              <a:ext uri="{FF2B5EF4-FFF2-40B4-BE49-F238E27FC236}">
+                <a16:creationId xmlns:a16="http://schemas.microsoft.com/office/drawing/2014/main" id="{C6D9C712-7144-4100-BCDB-F2CFAF7A1F31}"/>
+              </a:ext>
+            </a:extLst>
+          </p:cNvPr>
+          <p:cNvSpPr>
+            <a:spLocks noGrp="1"/>
+          </p:cNvSpPr>
+          <p:nvPr>
+            <p:ph idx="1"/>
+          </p:nvPr>
+        </p:nvSpPr>
+        <p:spPr/>
+        <p:txBody>
+          <a:bodyPr/>
+          <a:lstStyle/>
+          <a:p>
+            <a:endParaRPr lang="en-US"/>
+          </a:p>
+        </p:txBody>
+      </p:sp>
+      <p:sp>
+        <p:nvSpPr>
+          <p:cNvPr id="4" name="Slide Number Placeholder 3">
+            <a:extLst>
+              <a:ext uri="{FF2B5EF4-FFF2-40B4-BE49-F238E27FC236}">
+                <a16:creationId xmlns:a16="http://schemas.microsoft.com/office/drawing/2014/main" id="{ABDB7F91-3EE4-476A-9661-1648C797CBD1}"/>
+              </a:ext>
+            </a:extLst>
+          </p:cNvPr>
+          <p:cNvSpPr>
+            <a:spLocks noGrp="1"/>
+          </p:cNvSpPr>
+          <p:nvPr>
+            <p:ph type="sldNum" sz="quarter" idx="12"/>
+          </p:nvPr>
+        </p:nvSpPr>
+        <p:spPr/>
+        <p:txBody>
+          <a:bodyPr/>
+          <a:lstStyle/>
+          <a:p>
+            <a:fld id="{D57F1E4F-1CFF-5643-939E-217C01CDF565}" type="slidenum">
+              <a:rPr lang="en-US" smtClean="0"/>
+              <a:pPr/>
+              <a:t>16</a:t>
+            </a:fld>
+            <a:endParaRPr lang="en-US" dirty="0"/>
+          </a:p>
+        </p:txBody>
+      </p:sp>
+    </p:spTree>
+    <p:extLst>
+      <p:ext uri="{BB962C8B-B14F-4D97-AF65-F5344CB8AC3E}">
+        <p14:creationId xmlns:p14="http://schemas.microsoft.com/office/powerpoint/2010/main" val="1700607014"/>
+      </p:ext>
+    </p:extLst>
+  </p:cSld>
+  <p:clrMapOvr>
+    <a:masterClrMapping/>
+  </p:clrMapOvr>
+</p:sld>
+</file>
+
+<file path=ppt/slides/slide17.xml><?xml version="1.0" encoding="utf-8"?>
+<p:sld xmlns:a="http://schemas.openxmlformats.org/drawingml/2006/main" xmlns:r="http://schemas.openxmlformats.org/officeDocument/2006/relationships" xmlns:p="http://schemas.openxmlformats.org/presentationml/2006/main">
+  <p:cSld>
+    <p:spTree>
+      <p:nvGrpSpPr>
+        <p:cNvPr id="1" name=""/>
+        <p:cNvGrpSpPr/>
+        <p:nvPr/>
+      </p:nvGrpSpPr>
+      <p:grpSpPr>
+        <a:xfrm>
+          <a:off x="0" y="0"/>
+          <a:ext cx="0" cy="0"/>
+          <a:chOff x="0" y="0"/>
+          <a:chExt cx="0" cy="0"/>
+        </a:xfrm>
+      </p:grpSpPr>
+      <p:sp>
+        <p:nvSpPr>
+          <p:cNvPr id="2" name="Title 1">
+            <a:extLst>
+              <a:ext uri="{FF2B5EF4-FFF2-40B4-BE49-F238E27FC236}">
+                <a16:creationId xmlns:a16="http://schemas.microsoft.com/office/drawing/2014/main" id="{1183D399-4942-4C83-BF24-B436160EB419}"/>
+              </a:ext>
+            </a:extLst>
+          </p:cNvPr>
+          <p:cNvSpPr>
+            <a:spLocks noGrp="1"/>
+          </p:cNvSpPr>
+          <p:nvPr>
+            <p:ph type="title"/>
+          </p:nvPr>
+        </p:nvSpPr>
+        <p:spPr/>
+        <p:txBody>
+          <a:bodyPr/>
+          <a:lstStyle/>
+          <a:p>
+            <a:r>
+              <a:rPr lang="en-US" dirty="0"/>
+              <a:t>Sensors</a:t>
+            </a:r>
+          </a:p>
+        </p:txBody>
+      </p:sp>
+      <p:sp>
+        <p:nvSpPr>
+          <p:cNvPr id="3" name="Content Placeholder 2">
+            <a:extLst>
+              <a:ext uri="{FF2B5EF4-FFF2-40B4-BE49-F238E27FC236}">
+                <a16:creationId xmlns:a16="http://schemas.microsoft.com/office/drawing/2014/main" id="{0DD74EA9-167B-4010-AF9E-BA2A7445C522}"/>
+              </a:ext>
+            </a:extLst>
+          </p:cNvPr>
+          <p:cNvSpPr>
+            <a:spLocks noGrp="1"/>
+          </p:cNvSpPr>
+          <p:nvPr>
+            <p:ph idx="1"/>
+          </p:nvPr>
+        </p:nvSpPr>
+        <p:spPr/>
+        <p:txBody>
+          <a:bodyPr/>
+          <a:lstStyle/>
+          <a:p>
+            <a:endParaRPr lang="en-US"/>
+          </a:p>
+        </p:txBody>
+      </p:sp>
+      <p:sp>
+        <p:nvSpPr>
+          <p:cNvPr id="4" name="Slide Number Placeholder 3">
+            <a:extLst>
+              <a:ext uri="{FF2B5EF4-FFF2-40B4-BE49-F238E27FC236}">
+                <a16:creationId xmlns:a16="http://schemas.microsoft.com/office/drawing/2014/main" id="{54E49C07-2ECF-4660-8582-3A662CD53904}"/>
+              </a:ext>
+            </a:extLst>
+          </p:cNvPr>
+          <p:cNvSpPr>
+            <a:spLocks noGrp="1"/>
+          </p:cNvSpPr>
+          <p:nvPr>
+            <p:ph type="sldNum" sz="quarter" idx="12"/>
+          </p:nvPr>
+        </p:nvSpPr>
+        <p:spPr/>
+        <p:txBody>
+          <a:bodyPr/>
+          <a:lstStyle/>
+          <a:p>
+            <a:fld id="{D57F1E4F-1CFF-5643-939E-217C01CDF565}" type="slidenum">
+              <a:rPr lang="en-US" smtClean="0"/>
+              <a:pPr/>
+              <a:t>17</a:t>
+            </a:fld>
+            <a:endParaRPr lang="en-US" dirty="0"/>
+          </a:p>
+        </p:txBody>
+      </p:sp>
+    </p:spTree>
+    <p:extLst>
+      <p:ext uri="{BB962C8B-B14F-4D97-AF65-F5344CB8AC3E}">
+        <p14:creationId xmlns:p14="http://schemas.microsoft.com/office/powerpoint/2010/main" val="3652658612"/>
+      </p:ext>
+    </p:extLst>
+  </p:cSld>
+  <p:clrMapOvr>
+    <a:masterClrMapping/>
+  </p:clrMapOvr>
+</p:sld>
+</file>
+
+<file path=ppt/slides/slide18.xml><?xml version="1.0" encoding="utf-8"?>
+<p:sld xmlns:a="http://schemas.openxmlformats.org/drawingml/2006/main" xmlns:r="http://schemas.openxmlformats.org/officeDocument/2006/relationships" xmlns:p="http://schemas.openxmlformats.org/presentationml/2006/main">
+  <p:cSld>
+    <p:spTree>
+      <p:nvGrpSpPr>
+        <p:cNvPr id="1" name=""/>
+        <p:cNvGrpSpPr/>
+        <p:nvPr/>
+      </p:nvGrpSpPr>
+      <p:grpSpPr>
+        <a:xfrm>
+          <a:off x="0" y="0"/>
+          <a:ext cx="0" cy="0"/>
+          <a:chOff x="0" y="0"/>
+          <a:chExt cx="0" cy="0"/>
+        </a:xfrm>
+      </p:grpSpPr>
+      <p:sp>
+        <p:nvSpPr>
+          <p:cNvPr id="2" name="Title 1">
+            <a:extLst>
+              <a:ext uri="{FF2B5EF4-FFF2-40B4-BE49-F238E27FC236}">
+                <a16:creationId xmlns:a16="http://schemas.microsoft.com/office/drawing/2014/main" id="{AB1A53DB-70FB-432D-BCAF-DCFBCCE6B023}"/>
+              </a:ext>
+            </a:extLst>
+          </p:cNvPr>
+          <p:cNvSpPr>
+            <a:spLocks noGrp="1"/>
+          </p:cNvSpPr>
+          <p:nvPr>
+            <p:ph type="title"/>
+          </p:nvPr>
+        </p:nvSpPr>
+        <p:spPr/>
+        <p:txBody>
+          <a:bodyPr/>
+          <a:lstStyle/>
+          <a:p>
+            <a:r>
+              <a:rPr lang="en-US" dirty="0" err="1"/>
+              <a:t>MapBox</a:t>
+            </a:r>
+            <a:r>
+              <a:rPr lang="en-US" dirty="0"/>
+              <a:t> API</a:t>
+            </a:r>
+          </a:p>
+        </p:txBody>
+      </p:sp>
+      <p:sp>
+        <p:nvSpPr>
+          <p:cNvPr id="3" name="Content Placeholder 2">
+            <a:extLst>
+              <a:ext uri="{FF2B5EF4-FFF2-40B4-BE49-F238E27FC236}">
+                <a16:creationId xmlns:a16="http://schemas.microsoft.com/office/drawing/2014/main" id="{A6866161-0CFB-4603-9213-EC107AF2D1E8}"/>
+              </a:ext>
+            </a:extLst>
+          </p:cNvPr>
+          <p:cNvSpPr>
+            <a:spLocks noGrp="1"/>
+          </p:cNvSpPr>
+          <p:nvPr>
+            <p:ph idx="1"/>
+          </p:nvPr>
+        </p:nvSpPr>
+        <p:spPr/>
+        <p:txBody>
+          <a:bodyPr/>
+          <a:lstStyle/>
+          <a:p>
+            <a:endParaRPr lang="en-US"/>
+          </a:p>
+        </p:txBody>
+      </p:sp>
+      <p:sp>
+        <p:nvSpPr>
+          <p:cNvPr id="4" name="Slide Number Placeholder 3">
+            <a:extLst>
+              <a:ext uri="{FF2B5EF4-FFF2-40B4-BE49-F238E27FC236}">
+                <a16:creationId xmlns:a16="http://schemas.microsoft.com/office/drawing/2014/main" id="{46B07E3D-35B9-4761-9561-21093A66968A}"/>
+              </a:ext>
+            </a:extLst>
+          </p:cNvPr>
+          <p:cNvSpPr>
+            <a:spLocks noGrp="1"/>
+          </p:cNvSpPr>
+          <p:nvPr>
+            <p:ph type="sldNum" sz="quarter" idx="12"/>
+          </p:nvPr>
+        </p:nvSpPr>
+        <p:spPr/>
+        <p:txBody>
+          <a:bodyPr/>
+          <a:lstStyle/>
+          <a:p>
+            <a:fld id="{D57F1E4F-1CFF-5643-939E-217C01CDF565}" type="slidenum">
+              <a:rPr lang="en-US" smtClean="0"/>
+              <a:pPr/>
+              <a:t>18</a:t>
+            </a:fld>
+            <a:endParaRPr lang="en-US" dirty="0"/>
+          </a:p>
+        </p:txBody>
+      </p:sp>
+    </p:spTree>
+    <p:extLst>
+      <p:ext uri="{BB962C8B-B14F-4D97-AF65-F5344CB8AC3E}">
+        <p14:creationId xmlns:p14="http://schemas.microsoft.com/office/powerpoint/2010/main" val="3591823853"/>
+      </p:ext>
+    </p:extLst>
+  </p:cSld>
+  <p:clrMapOvr>
+    <a:masterClrMapping/>
+  </p:clrMapOvr>
+</p:sld>
+</file>
+
+<file path=ppt/slides/slide19.xml><?xml version="1.0" encoding="utf-8"?>
+<p:sld xmlns:a="http://schemas.openxmlformats.org/drawingml/2006/main" xmlns:r="http://schemas.openxmlformats.org/officeDocument/2006/relationships" xmlns:p="http://schemas.openxmlformats.org/presentationml/2006/main">
+  <p:cSld>
+    <p:spTree>
+      <p:nvGrpSpPr>
+        <p:cNvPr id="1" name=""/>
+        <p:cNvGrpSpPr/>
+        <p:nvPr/>
+      </p:nvGrpSpPr>
+      <p:grpSpPr>
+        <a:xfrm>
+          <a:off x="0" y="0"/>
+          <a:ext cx="0" cy="0"/>
+          <a:chOff x="0" y="0"/>
+          <a:chExt cx="0" cy="0"/>
+        </a:xfrm>
+      </p:grpSpPr>
+      <p:sp>
+        <p:nvSpPr>
+          <p:cNvPr id="2" name="Title 1">
+            <a:extLst>
+              <a:ext uri="{FF2B5EF4-FFF2-40B4-BE49-F238E27FC236}">
+                <a16:creationId xmlns:a16="http://schemas.microsoft.com/office/drawing/2014/main" id="{F2AB9014-8A31-4680-8991-595A8A0A7749}"/>
+              </a:ext>
+            </a:extLst>
+          </p:cNvPr>
+          <p:cNvSpPr>
+            <a:spLocks noGrp="1"/>
+          </p:cNvSpPr>
+          <p:nvPr>
+            <p:ph type="title"/>
+          </p:nvPr>
+        </p:nvSpPr>
+        <p:spPr/>
+        <p:txBody>
+          <a:bodyPr/>
+          <a:lstStyle/>
+          <a:p>
+            <a:r>
+              <a:rPr lang="en-US" dirty="0"/>
+              <a:t>Database</a:t>
+            </a:r>
+          </a:p>
+        </p:txBody>
+      </p:sp>
+      <p:sp>
+        <p:nvSpPr>
+          <p:cNvPr id="3" name="Content Placeholder 2">
+            <a:extLst>
+              <a:ext uri="{FF2B5EF4-FFF2-40B4-BE49-F238E27FC236}">
+                <a16:creationId xmlns:a16="http://schemas.microsoft.com/office/drawing/2014/main" id="{943385D6-20E6-41CB-94E2-C41E10317A02}"/>
+              </a:ext>
+            </a:extLst>
+          </p:cNvPr>
+          <p:cNvSpPr>
+            <a:spLocks noGrp="1"/>
+          </p:cNvSpPr>
+          <p:nvPr>
+            <p:ph idx="1"/>
+          </p:nvPr>
+        </p:nvSpPr>
+        <p:spPr/>
+        <p:txBody>
+          <a:bodyPr/>
+          <a:lstStyle/>
+          <a:p>
+            <a:endParaRPr lang="en-US"/>
+          </a:p>
+        </p:txBody>
+      </p:sp>
+      <p:sp>
+        <p:nvSpPr>
+          <p:cNvPr id="4" name="Slide Number Placeholder 3">
+            <a:extLst>
+              <a:ext uri="{FF2B5EF4-FFF2-40B4-BE49-F238E27FC236}">
+                <a16:creationId xmlns:a16="http://schemas.microsoft.com/office/drawing/2014/main" id="{D85744C6-A06A-4F75-9D77-276BE5D6962F}"/>
+              </a:ext>
+            </a:extLst>
+          </p:cNvPr>
+          <p:cNvSpPr>
+            <a:spLocks noGrp="1"/>
+          </p:cNvSpPr>
+          <p:nvPr>
+            <p:ph type="sldNum" sz="quarter" idx="12"/>
+          </p:nvPr>
+        </p:nvSpPr>
+        <p:spPr/>
+        <p:txBody>
+          <a:bodyPr/>
+          <a:lstStyle/>
+          <a:p>
+            <a:fld id="{D57F1E4F-1CFF-5643-939E-217C01CDF565}" type="slidenum">
+              <a:rPr lang="en-US" smtClean="0"/>
+              <a:pPr/>
+              <a:t>19</a:t>
+            </a:fld>
+            <a:endParaRPr lang="en-US" dirty="0"/>
+          </a:p>
+        </p:txBody>
+      </p:sp>
+    </p:spTree>
+    <p:extLst>
+      <p:ext uri="{BB962C8B-B14F-4D97-AF65-F5344CB8AC3E}">
+        <p14:creationId xmlns:p14="http://schemas.microsoft.com/office/powerpoint/2010/main" val="735481043"/>
+      </p:ext>
+    </p:extLst>
+  </p:cSld>
+  <p:clrMapOvr>
+    <a:masterClrMapping/>
+  </p:clrMapOvr>
+</p:sld>
+</file>
+
 <file path=ppt/slides/slide2.xml><?xml version="1.0" encoding="utf-8"?>
 <p:sld xmlns:a="http://schemas.openxmlformats.org/drawingml/2006/main" xmlns:r="http://schemas.openxmlformats.org/officeDocument/2006/relationships" xmlns:p="http://schemas.openxmlformats.org/presentationml/2006/main">
   <p:cSld>
@@ -8180,6 +9400,458 @@
     <p:extLst>
       <p:ext uri="{BB962C8B-B14F-4D97-AF65-F5344CB8AC3E}">
         <p14:creationId xmlns:p14="http://schemas.microsoft.com/office/powerpoint/2010/main" val="3869370020"/>
+      </p:ext>
+    </p:extLst>
+  </p:cSld>
+  <p:clrMapOvr>
+    <a:masterClrMapping/>
+  </p:clrMapOvr>
+</p:sld>
+</file>
+
+<file path=ppt/slides/slide20.xml><?xml version="1.0" encoding="utf-8"?>
+<p:sld xmlns:a="http://schemas.openxmlformats.org/drawingml/2006/main" xmlns:r="http://schemas.openxmlformats.org/officeDocument/2006/relationships" xmlns:p="http://schemas.openxmlformats.org/presentationml/2006/main">
+  <p:cSld>
+    <p:spTree>
+      <p:nvGrpSpPr>
+        <p:cNvPr id="1" name=""/>
+        <p:cNvGrpSpPr/>
+        <p:nvPr/>
+      </p:nvGrpSpPr>
+      <p:grpSpPr>
+        <a:xfrm>
+          <a:off x="0" y="0"/>
+          <a:ext cx="0" cy="0"/>
+          <a:chOff x="0" y="0"/>
+          <a:chExt cx="0" cy="0"/>
+        </a:xfrm>
+      </p:grpSpPr>
+      <p:sp>
+        <p:nvSpPr>
+          <p:cNvPr id="2" name="Title 1">
+            <a:extLst>
+              <a:ext uri="{FF2B5EF4-FFF2-40B4-BE49-F238E27FC236}">
+                <a16:creationId xmlns:a16="http://schemas.microsoft.com/office/drawing/2014/main" id="{E745B5BA-CEC8-422E-982B-F8BC98723754}"/>
+              </a:ext>
+            </a:extLst>
+          </p:cNvPr>
+          <p:cNvSpPr>
+            <a:spLocks noGrp="1"/>
+          </p:cNvSpPr>
+          <p:nvPr>
+            <p:ph type="title"/>
+          </p:nvPr>
+        </p:nvSpPr>
+        <p:spPr/>
+        <p:txBody>
+          <a:bodyPr/>
+          <a:lstStyle/>
+          <a:p>
+            <a:r>
+              <a:rPr lang="en-US" dirty="0"/>
+              <a:t>Questions?</a:t>
+            </a:r>
+          </a:p>
+        </p:txBody>
+      </p:sp>
+      <p:sp>
+        <p:nvSpPr>
+          <p:cNvPr id="3" name="Content Placeholder 2">
+            <a:extLst>
+              <a:ext uri="{FF2B5EF4-FFF2-40B4-BE49-F238E27FC236}">
+                <a16:creationId xmlns:a16="http://schemas.microsoft.com/office/drawing/2014/main" id="{737908CF-DFCF-479E-B76A-2140E612B90F}"/>
+              </a:ext>
+            </a:extLst>
+          </p:cNvPr>
+          <p:cNvSpPr>
+            <a:spLocks noGrp="1"/>
+          </p:cNvSpPr>
+          <p:nvPr>
+            <p:ph idx="1"/>
+          </p:nvPr>
+        </p:nvSpPr>
+        <p:spPr/>
+        <p:txBody>
+          <a:bodyPr/>
+          <a:lstStyle/>
+          <a:p>
+            <a:endParaRPr lang="en-US"/>
+          </a:p>
+        </p:txBody>
+      </p:sp>
+      <p:sp>
+        <p:nvSpPr>
+          <p:cNvPr id="4" name="Slide Number Placeholder 3">
+            <a:extLst>
+              <a:ext uri="{FF2B5EF4-FFF2-40B4-BE49-F238E27FC236}">
+                <a16:creationId xmlns:a16="http://schemas.microsoft.com/office/drawing/2014/main" id="{DF8C3242-F7F3-4B6D-BE97-C08D1A7EC84D}"/>
+              </a:ext>
+            </a:extLst>
+          </p:cNvPr>
+          <p:cNvSpPr>
+            <a:spLocks noGrp="1"/>
+          </p:cNvSpPr>
+          <p:nvPr>
+            <p:ph type="sldNum" sz="quarter" idx="12"/>
+          </p:nvPr>
+        </p:nvSpPr>
+        <p:spPr/>
+        <p:txBody>
+          <a:bodyPr/>
+          <a:lstStyle/>
+          <a:p>
+            <a:fld id="{D57F1E4F-1CFF-5643-939E-217C01CDF565}" type="slidenum">
+              <a:rPr lang="en-US" smtClean="0"/>
+              <a:pPr/>
+              <a:t>20</a:t>
+            </a:fld>
+            <a:endParaRPr lang="en-US" dirty="0"/>
+          </a:p>
+        </p:txBody>
+      </p:sp>
+    </p:spTree>
+    <p:extLst>
+      <p:ext uri="{BB962C8B-B14F-4D97-AF65-F5344CB8AC3E}">
+        <p14:creationId xmlns:p14="http://schemas.microsoft.com/office/powerpoint/2010/main" val="1587191523"/>
+      </p:ext>
+    </p:extLst>
+  </p:cSld>
+  <p:clrMapOvr>
+    <a:masterClrMapping/>
+  </p:clrMapOvr>
+</p:sld>
+</file>
+
+<file path=ppt/slides/slide21.xml><?xml version="1.0" encoding="utf-8"?>
+<p:sld xmlns:a="http://schemas.openxmlformats.org/drawingml/2006/main" xmlns:r="http://schemas.openxmlformats.org/officeDocument/2006/relationships" xmlns:p="http://schemas.openxmlformats.org/presentationml/2006/main">
+  <p:cSld>
+    <p:spTree>
+      <p:nvGrpSpPr>
+        <p:cNvPr id="1" name=""/>
+        <p:cNvGrpSpPr/>
+        <p:nvPr/>
+      </p:nvGrpSpPr>
+      <p:grpSpPr>
+        <a:xfrm>
+          <a:off x="0" y="0"/>
+          <a:ext cx="0" cy="0"/>
+          <a:chOff x="0" y="0"/>
+          <a:chExt cx="0" cy="0"/>
+        </a:xfrm>
+      </p:grpSpPr>
+      <p:sp>
+        <p:nvSpPr>
+          <p:cNvPr id="2" name="Title 1">
+            <a:extLst>
+              <a:ext uri="{FF2B5EF4-FFF2-40B4-BE49-F238E27FC236}">
+                <a16:creationId xmlns:a16="http://schemas.microsoft.com/office/drawing/2014/main" id="{0925D358-7D77-482A-BA62-AF4AAB8E726F}"/>
+              </a:ext>
+            </a:extLst>
+          </p:cNvPr>
+          <p:cNvSpPr>
+            <a:spLocks noGrp="1"/>
+          </p:cNvSpPr>
+          <p:nvPr>
+            <p:ph type="title"/>
+          </p:nvPr>
+        </p:nvSpPr>
+        <p:spPr/>
+        <p:txBody>
+          <a:bodyPr/>
+          <a:lstStyle/>
+          <a:p>
+            <a:r>
+              <a:rPr lang="en-US" dirty="0"/>
+              <a:t>Unofficial Sprint</a:t>
+            </a:r>
+          </a:p>
+        </p:txBody>
+      </p:sp>
+      <p:sp>
+        <p:nvSpPr>
+          <p:cNvPr id="3" name="Content Placeholder 2">
+            <a:extLst>
+              <a:ext uri="{FF2B5EF4-FFF2-40B4-BE49-F238E27FC236}">
+                <a16:creationId xmlns:a16="http://schemas.microsoft.com/office/drawing/2014/main" id="{6A41BCA7-F42D-4C14-9EE3-C0604BD1C8ED}"/>
+              </a:ext>
+            </a:extLst>
+          </p:cNvPr>
+          <p:cNvSpPr>
+            <a:spLocks noGrp="1"/>
+          </p:cNvSpPr>
+          <p:nvPr>
+            <p:ph idx="1"/>
+          </p:nvPr>
+        </p:nvSpPr>
+        <p:spPr/>
+        <p:txBody>
+          <a:bodyPr/>
+          <a:lstStyle/>
+          <a:p>
+            <a:endParaRPr lang="en-US"/>
+          </a:p>
+        </p:txBody>
+      </p:sp>
+      <p:sp>
+        <p:nvSpPr>
+          <p:cNvPr id="4" name="Slide Number Placeholder 3">
+            <a:extLst>
+              <a:ext uri="{FF2B5EF4-FFF2-40B4-BE49-F238E27FC236}">
+                <a16:creationId xmlns:a16="http://schemas.microsoft.com/office/drawing/2014/main" id="{BB4882C3-32B5-455C-9E1C-9DBFC4D3EA7C}"/>
+              </a:ext>
+            </a:extLst>
+          </p:cNvPr>
+          <p:cNvSpPr>
+            <a:spLocks noGrp="1"/>
+          </p:cNvSpPr>
+          <p:nvPr>
+            <p:ph type="sldNum" sz="quarter" idx="12"/>
+          </p:nvPr>
+        </p:nvSpPr>
+        <p:spPr/>
+        <p:txBody>
+          <a:bodyPr/>
+          <a:lstStyle/>
+          <a:p>
+            <a:fld id="{D57F1E4F-1CFF-5643-939E-217C01CDF565}" type="slidenum">
+              <a:rPr lang="en-US" smtClean="0"/>
+              <a:pPr/>
+              <a:t>21</a:t>
+            </a:fld>
+            <a:endParaRPr lang="en-US" dirty="0"/>
+          </a:p>
+        </p:txBody>
+      </p:sp>
+    </p:spTree>
+    <p:extLst>
+      <p:ext uri="{BB962C8B-B14F-4D97-AF65-F5344CB8AC3E}">
+        <p14:creationId xmlns:p14="http://schemas.microsoft.com/office/powerpoint/2010/main" val="4099954266"/>
+      </p:ext>
+    </p:extLst>
+  </p:cSld>
+  <p:clrMapOvr>
+    <a:masterClrMapping/>
+  </p:clrMapOvr>
+</p:sld>
+</file>
+
+<file path=ppt/slides/slide22.xml><?xml version="1.0" encoding="utf-8"?>
+<p:sld xmlns:a="http://schemas.openxmlformats.org/drawingml/2006/main" xmlns:r="http://schemas.openxmlformats.org/officeDocument/2006/relationships" xmlns:p="http://schemas.openxmlformats.org/presentationml/2006/main">
+  <p:cSld>
+    <p:spTree>
+      <p:nvGrpSpPr>
+        <p:cNvPr id="1" name=""/>
+        <p:cNvGrpSpPr/>
+        <p:nvPr/>
+      </p:nvGrpSpPr>
+      <p:grpSpPr>
+        <a:xfrm>
+          <a:off x="0" y="0"/>
+          <a:ext cx="0" cy="0"/>
+          <a:chOff x="0" y="0"/>
+          <a:chExt cx="0" cy="0"/>
+        </a:xfrm>
+      </p:grpSpPr>
+      <p:sp>
+        <p:nvSpPr>
+          <p:cNvPr id="2" name="Title 1">
+            <a:extLst>
+              <a:ext uri="{FF2B5EF4-FFF2-40B4-BE49-F238E27FC236}">
+                <a16:creationId xmlns:a16="http://schemas.microsoft.com/office/drawing/2014/main" id="{AD0AB5FE-C138-421F-92EE-1844FDF7256A}"/>
+              </a:ext>
+            </a:extLst>
+          </p:cNvPr>
+          <p:cNvSpPr>
+            <a:spLocks noGrp="1"/>
+          </p:cNvSpPr>
+          <p:nvPr>
+            <p:ph type="title"/>
+          </p:nvPr>
+        </p:nvSpPr>
+        <p:spPr/>
+        <p:txBody>
+          <a:bodyPr/>
+          <a:lstStyle/>
+          <a:p>
+            <a:r>
+              <a:rPr lang="en-US" dirty="0"/>
+              <a:t>Sprint 2</a:t>
+            </a:r>
+          </a:p>
+        </p:txBody>
+      </p:sp>
+      <p:sp>
+        <p:nvSpPr>
+          <p:cNvPr id="3" name="Content Placeholder 2">
+            <a:extLst>
+              <a:ext uri="{FF2B5EF4-FFF2-40B4-BE49-F238E27FC236}">
+                <a16:creationId xmlns:a16="http://schemas.microsoft.com/office/drawing/2014/main" id="{903C4FAD-1519-4538-BD82-6A08BE138CB6}"/>
+              </a:ext>
+            </a:extLst>
+          </p:cNvPr>
+          <p:cNvSpPr>
+            <a:spLocks noGrp="1"/>
+          </p:cNvSpPr>
+          <p:nvPr>
+            <p:ph idx="1"/>
+          </p:nvPr>
+        </p:nvSpPr>
+        <p:spPr/>
+        <p:txBody>
+          <a:bodyPr/>
+          <a:lstStyle/>
+          <a:p>
+            <a:endParaRPr lang="en-US"/>
+          </a:p>
+        </p:txBody>
+      </p:sp>
+      <p:sp>
+        <p:nvSpPr>
+          <p:cNvPr id="4" name="Slide Number Placeholder 3">
+            <a:extLst>
+              <a:ext uri="{FF2B5EF4-FFF2-40B4-BE49-F238E27FC236}">
+                <a16:creationId xmlns:a16="http://schemas.microsoft.com/office/drawing/2014/main" id="{2D0C1AF0-2A5F-49B5-B744-94150C0B7BD5}"/>
+              </a:ext>
+            </a:extLst>
+          </p:cNvPr>
+          <p:cNvSpPr>
+            <a:spLocks noGrp="1"/>
+          </p:cNvSpPr>
+          <p:nvPr>
+            <p:ph type="sldNum" sz="quarter" idx="12"/>
+          </p:nvPr>
+        </p:nvSpPr>
+        <p:spPr/>
+        <p:txBody>
+          <a:bodyPr/>
+          <a:lstStyle/>
+          <a:p>
+            <a:fld id="{D57F1E4F-1CFF-5643-939E-217C01CDF565}" type="slidenum">
+              <a:rPr lang="en-US" smtClean="0"/>
+              <a:pPr/>
+              <a:t>22</a:t>
+            </a:fld>
+            <a:endParaRPr lang="en-US" dirty="0"/>
+          </a:p>
+        </p:txBody>
+      </p:sp>
+    </p:spTree>
+    <p:extLst>
+      <p:ext uri="{BB962C8B-B14F-4D97-AF65-F5344CB8AC3E}">
+        <p14:creationId xmlns:p14="http://schemas.microsoft.com/office/powerpoint/2010/main" val="632679123"/>
+      </p:ext>
+    </p:extLst>
+  </p:cSld>
+  <p:clrMapOvr>
+    <a:masterClrMapping/>
+  </p:clrMapOvr>
+</p:sld>
+</file>
+
+<file path=ppt/slides/slide23.xml><?xml version="1.0" encoding="utf-8"?>
+<p:sld xmlns:a="http://schemas.openxmlformats.org/drawingml/2006/main" xmlns:r="http://schemas.openxmlformats.org/officeDocument/2006/relationships" xmlns:p="http://schemas.openxmlformats.org/presentationml/2006/main">
+  <p:cSld>
+    <p:spTree>
+      <p:nvGrpSpPr>
+        <p:cNvPr id="1" name=""/>
+        <p:cNvGrpSpPr/>
+        <p:nvPr/>
+      </p:nvGrpSpPr>
+      <p:grpSpPr>
+        <a:xfrm>
+          <a:off x="0" y="0"/>
+          <a:ext cx="0" cy="0"/>
+          <a:chOff x="0" y="0"/>
+          <a:chExt cx="0" cy="0"/>
+        </a:xfrm>
+      </p:grpSpPr>
+      <p:sp>
+        <p:nvSpPr>
+          <p:cNvPr id="2" name="Title 1">
+            <a:extLst>
+              <a:ext uri="{FF2B5EF4-FFF2-40B4-BE49-F238E27FC236}">
+                <a16:creationId xmlns:a16="http://schemas.microsoft.com/office/drawing/2014/main" id="{5DE1D604-AE0D-4070-84FA-E88517FF5DFF}"/>
+              </a:ext>
+            </a:extLst>
+          </p:cNvPr>
+          <p:cNvSpPr>
+            <a:spLocks noGrp="1"/>
+          </p:cNvSpPr>
+          <p:nvPr>
+            <p:ph type="title"/>
+          </p:nvPr>
+        </p:nvSpPr>
+        <p:spPr/>
+        <p:txBody>
+          <a:bodyPr/>
+          <a:lstStyle/>
+          <a:p>
+            <a:r>
+              <a:rPr lang="en-US"/>
+              <a:t>Questions?</a:t>
+            </a:r>
+          </a:p>
+        </p:txBody>
+      </p:sp>
+      <p:sp>
+        <p:nvSpPr>
+          <p:cNvPr id="3" name="Content Placeholder 2">
+            <a:extLst>
+              <a:ext uri="{FF2B5EF4-FFF2-40B4-BE49-F238E27FC236}">
+                <a16:creationId xmlns:a16="http://schemas.microsoft.com/office/drawing/2014/main" id="{E38BF89C-DFBF-421E-A964-AE3C9E1FC370}"/>
+              </a:ext>
+            </a:extLst>
+          </p:cNvPr>
+          <p:cNvSpPr>
+            <a:spLocks noGrp="1"/>
+          </p:cNvSpPr>
+          <p:nvPr>
+            <p:ph idx="1"/>
+          </p:nvPr>
+        </p:nvSpPr>
+        <p:spPr/>
+        <p:txBody>
+          <a:bodyPr/>
+          <a:lstStyle/>
+          <a:p>
+            <a:endParaRPr lang="en-US"/>
+          </a:p>
+        </p:txBody>
+      </p:sp>
+      <p:sp>
+        <p:nvSpPr>
+          <p:cNvPr id="4" name="Slide Number Placeholder 3">
+            <a:extLst>
+              <a:ext uri="{FF2B5EF4-FFF2-40B4-BE49-F238E27FC236}">
+                <a16:creationId xmlns:a16="http://schemas.microsoft.com/office/drawing/2014/main" id="{6DD83CE4-B7F7-4E5E-9EA9-93BC3E139089}"/>
+              </a:ext>
+            </a:extLst>
+          </p:cNvPr>
+          <p:cNvSpPr>
+            <a:spLocks noGrp="1"/>
+          </p:cNvSpPr>
+          <p:nvPr>
+            <p:ph type="sldNum" sz="quarter" idx="12"/>
+          </p:nvPr>
+        </p:nvSpPr>
+        <p:spPr/>
+        <p:txBody>
+          <a:bodyPr/>
+          <a:lstStyle/>
+          <a:p>
+            <a:fld id="{D57F1E4F-1CFF-5643-939E-217C01CDF565}" type="slidenum">
+              <a:rPr lang="en-US" smtClean="0"/>
+              <a:pPr/>
+              <a:t>23</a:t>
+            </a:fld>
+            <a:endParaRPr lang="en-US" dirty="0"/>
+          </a:p>
+        </p:txBody>
+      </p:sp>
+    </p:spTree>
+    <p:extLst>
+      <p:ext uri="{BB962C8B-B14F-4D97-AF65-F5344CB8AC3E}">
+        <p14:creationId xmlns:p14="http://schemas.microsoft.com/office/powerpoint/2010/main" val="490955183"/>
       </p:ext>
     </p:extLst>
   </p:cSld>
@@ -8211,7 +9883,7 @@
           <p:cNvPr id="2" name="Title 1">
             <a:extLst>
               <a:ext uri="{FF2B5EF4-FFF2-40B4-BE49-F238E27FC236}">
-                <a16:creationId xmlns:a16="http://schemas.microsoft.com/office/drawing/2014/main" id="{97A51132-5F7C-4458-A7CA-40C03DC63E1A}"/>
+                <a16:creationId xmlns:a16="http://schemas.microsoft.com/office/drawing/2014/main" id="{F2D35386-6553-4F40-B13E-39127AE27598}"/>
               </a:ext>
             </a:extLst>
           </p:cNvPr>
@@ -8229,7 +9901,7 @@
           <a:p>
             <a:r>
               <a:rPr lang="en-US" dirty="0"/>
-              <a:t>Product Backlog</a:t>
+              <a:t>Core Functionality</a:t>
             </a:r>
           </a:p>
         </p:txBody>
@@ -8239,7 +9911,7 @@
           <p:cNvPr id="3" name="Content Placeholder 2">
             <a:extLst>
               <a:ext uri="{FF2B5EF4-FFF2-40B4-BE49-F238E27FC236}">
-                <a16:creationId xmlns:a16="http://schemas.microsoft.com/office/drawing/2014/main" id="{AC52C316-830D-462A-8F67-9BA0E80F4A72}"/>
+                <a16:creationId xmlns:a16="http://schemas.microsoft.com/office/drawing/2014/main" id="{B215CA30-6357-4A93-9C6E-ABDCF65F48B0}"/>
               </a:ext>
             </a:extLst>
           </p:cNvPr>
@@ -8257,28 +9929,60 @@
           <a:p>
             <a:r>
               <a:rPr lang="en-US" dirty="0"/>
-              <a:t>GUI Design to accommodate User Stories, Core Functionality, and possibly scalable to future stretch goals.</a:t>
+              <a:t>What did we consider important to Core Functionality and project development?</a:t>
             </a:r>
           </a:p>
           <a:p>
             <a:pPr lvl="1"/>
             <a:r>
               <a:rPr lang="en-US" dirty="0"/>
-              <a:t>Mockups</a:t>
+              <a:t>Design</a:t>
             </a:r>
           </a:p>
           <a:p>
             <a:pPr lvl="1"/>
             <a:r>
               <a:rPr lang="en-US" dirty="0"/>
-              <a:t>Bare-bones implementation</a:t>
+              <a:t>Algorithm</a:t>
             </a:r>
           </a:p>
           <a:p>
             <a:pPr lvl="1"/>
             <a:r>
               <a:rPr lang="en-US" dirty="0"/>
-              <a:t>User Story verification – Does GUI functionality align with User Stories?</a:t>
+              <a:t>GUI</a:t>
+            </a:r>
+          </a:p>
+          <a:p>
+            <a:pPr lvl="1"/>
+            <a:r>
+              <a:rPr lang="en-US" dirty="0" err="1"/>
+              <a:t>MapBox</a:t>
+            </a:r>
+            <a:r>
+              <a:rPr lang="en-US" dirty="0"/>
+              <a:t> API</a:t>
+            </a:r>
+          </a:p>
+          <a:p>
+            <a:pPr lvl="1"/>
+            <a:r>
+              <a:rPr lang="en-US" dirty="0"/>
+              <a:t>More Research</a:t>
+            </a:r>
+          </a:p>
+          <a:p>
+            <a:pPr lvl="2"/>
+            <a:r>
+              <a:rPr lang="en-US" dirty="0"/>
+              <a:t>Database</a:t>
+            </a:r>
+          </a:p>
+          <a:p>
+            <a:pPr lvl="2"/>
+            <a:r>
+              <a:rPr lang="en-US" dirty="0"/>
+              <a:t>Supporting Technologies</a:t>
             </a:r>
           </a:p>
         </p:txBody>
@@ -8288,7 +9992,7 @@
           <p:cNvPr id="4" name="Slide Number Placeholder 3">
             <a:extLst>
               <a:ext uri="{FF2B5EF4-FFF2-40B4-BE49-F238E27FC236}">
-                <a16:creationId xmlns:a16="http://schemas.microsoft.com/office/drawing/2014/main" id="{7DC007F5-0198-4CE9-837A-8E4EBDFB3638}"/>
+                <a16:creationId xmlns:a16="http://schemas.microsoft.com/office/drawing/2014/main" id="{367A8BEF-7F6E-4089-833F-9809F9A867A4}"/>
               </a:ext>
             </a:extLst>
           </p:cNvPr>
@@ -8316,7 +10020,7 @@
     </p:spTree>
     <p:extLst>
       <p:ext uri="{BB962C8B-B14F-4D97-AF65-F5344CB8AC3E}">
-        <p14:creationId xmlns:p14="http://schemas.microsoft.com/office/powerpoint/2010/main" val="2483174827"/>
+        <p14:creationId xmlns:p14="http://schemas.microsoft.com/office/powerpoint/2010/main" val="2687585637"/>
       </p:ext>
     </p:extLst>
   </p:cSld>
@@ -8348,7 +10052,7 @@
           <p:cNvPr id="2" name="Title 1">
             <a:extLst>
               <a:ext uri="{FF2B5EF4-FFF2-40B4-BE49-F238E27FC236}">
-                <a16:creationId xmlns:a16="http://schemas.microsoft.com/office/drawing/2014/main" id="{8B25CC60-678F-4ABC-A286-B6474D7DA369}"/>
+                <a16:creationId xmlns:a16="http://schemas.microsoft.com/office/drawing/2014/main" id="{5199C9B0-06E2-410E-8DDA-ABF5228032EA}"/>
               </a:ext>
             </a:extLst>
           </p:cNvPr>
@@ -8366,15 +10070,7 @@
           <a:p>
             <a:r>
               <a:rPr lang="en-US" dirty="0"/>
-              <a:t>Product Backlog (</a:t>
-            </a:r>
-            <a:r>
-              <a:rPr lang="en-US" dirty="0" err="1"/>
-              <a:t>cont</a:t>
-            </a:r>
-            <a:r>
-              <a:rPr lang="en-US" dirty="0"/>
-              <a:t>)</a:t>
+              <a:t>Questions?</a:t>
             </a:r>
           </a:p>
         </p:txBody>
@@ -8384,7 +10080,7 @@
           <p:cNvPr id="3" name="Content Placeholder 2">
             <a:extLst>
               <a:ext uri="{FF2B5EF4-FFF2-40B4-BE49-F238E27FC236}">
-                <a16:creationId xmlns:a16="http://schemas.microsoft.com/office/drawing/2014/main" id="{A4A95409-D15F-4ACF-B8E2-B483B69F471C}"/>
+                <a16:creationId xmlns:a16="http://schemas.microsoft.com/office/drawing/2014/main" id="{0EA9F7AB-C9CE-47FF-B6ED-B5BF71D63066}"/>
               </a:ext>
             </a:extLst>
           </p:cNvPr>
@@ -8400,36 +10096,7 @@
           <a:bodyPr/>
           <a:lstStyle/>
           <a:p>
-            <a:r>
-              <a:rPr lang="en-US" dirty="0"/>
-              <a:t>Design Entity Relationship Diagram for Database</a:t>
-            </a:r>
-          </a:p>
-          <a:p>
-            <a:r>
-              <a:rPr lang="en-US" dirty="0"/>
-              <a:t>Thorough Investigation of Cloud Database solutions</a:t>
-            </a:r>
-          </a:p>
-          <a:p>
-            <a:r>
-              <a:rPr lang="en-US" dirty="0"/>
-              <a:t>Design a safe and secure local data storage solution.</a:t>
-            </a:r>
-          </a:p>
-          <a:p>
-            <a:pPr lvl="1"/>
-            <a:r>
-              <a:rPr lang="en-US" dirty="0"/>
-              <a:t>Verify Android’s On-Device SQLite capabilities</a:t>
-            </a:r>
-          </a:p>
-          <a:p>
-            <a:pPr lvl="1"/>
-            <a:r>
-              <a:rPr lang="en-US" dirty="0"/>
-              <a:t>Determine what kind of data needs to be stored where</a:t>
-            </a:r>
+            <a:endParaRPr lang="en-US"/>
           </a:p>
         </p:txBody>
       </p:sp>
@@ -8438,7 +10105,7 @@
           <p:cNvPr id="4" name="Slide Number Placeholder 3">
             <a:extLst>
               <a:ext uri="{FF2B5EF4-FFF2-40B4-BE49-F238E27FC236}">
-                <a16:creationId xmlns:a16="http://schemas.microsoft.com/office/drawing/2014/main" id="{2E8DA2EF-A6B0-4094-B638-5C0BABA0F1E5}"/>
+                <a16:creationId xmlns:a16="http://schemas.microsoft.com/office/drawing/2014/main" id="{41E5440E-F403-4B49-B638-14435F8F2B1D}"/>
               </a:ext>
             </a:extLst>
           </p:cNvPr>
@@ -8466,7 +10133,7 @@
     </p:spTree>
     <p:extLst>
       <p:ext uri="{BB962C8B-B14F-4D97-AF65-F5344CB8AC3E}">
-        <p14:creationId xmlns:p14="http://schemas.microsoft.com/office/powerpoint/2010/main" val="483748403"/>
+        <p14:creationId xmlns:p14="http://schemas.microsoft.com/office/powerpoint/2010/main" val="3997012760"/>
       </p:ext>
     </p:extLst>
   </p:cSld>
@@ -8498,7 +10165,7 @@
           <p:cNvPr id="2" name="Title 1">
             <a:extLst>
               <a:ext uri="{FF2B5EF4-FFF2-40B4-BE49-F238E27FC236}">
-                <a16:creationId xmlns:a16="http://schemas.microsoft.com/office/drawing/2014/main" id="{48FF45B5-D5FA-460B-991C-2FA108E3A3F1}"/>
+                <a16:creationId xmlns:a16="http://schemas.microsoft.com/office/drawing/2014/main" id="{B42A0C66-3F52-409A-9CE7-5570CF118EC1}"/>
               </a:ext>
             </a:extLst>
           </p:cNvPr>
@@ -8516,15 +10183,7 @@
           <a:p>
             <a:r>
               <a:rPr lang="en-US" dirty="0"/>
-              <a:t>Product Backlog (</a:t>
-            </a:r>
-            <a:r>
-              <a:rPr lang="en-US" dirty="0" err="1"/>
-              <a:t>cont</a:t>
-            </a:r>
-            <a:r>
-              <a:rPr lang="en-US" dirty="0"/>
-              <a:t>)</a:t>
+              <a:t>Product Backlog</a:t>
             </a:r>
           </a:p>
         </p:txBody>
@@ -8534,7 +10193,7 @@
           <p:cNvPr id="3" name="Content Placeholder 2">
             <a:extLst>
               <a:ext uri="{FF2B5EF4-FFF2-40B4-BE49-F238E27FC236}">
-                <a16:creationId xmlns:a16="http://schemas.microsoft.com/office/drawing/2014/main" id="{E78EFE23-8489-47D3-809F-724D797C3D7A}"/>
+                <a16:creationId xmlns:a16="http://schemas.microsoft.com/office/drawing/2014/main" id="{453B0361-81CA-4B36-98AD-8CDC7D18FD88}"/>
               </a:ext>
             </a:extLst>
           </p:cNvPr>
@@ -8552,45 +10211,35 @@
           <a:p>
             <a:r>
               <a:rPr lang="en-US" dirty="0"/>
-              <a:t>Research into Google’s Android Authentication system</a:t>
-            </a:r>
-          </a:p>
-          <a:p>
+              <a:t>Develop Algorithm</a:t>
+            </a:r>
+          </a:p>
+          <a:p>
+            <a:pPr lvl="1"/>
             <a:r>
               <a:rPr lang="en-US" dirty="0"/>
-              <a:t>Document and Determine necessary </a:t>
-            </a:r>
-            <a:r>
-              <a:rPr lang="en-US" dirty="0" err="1"/>
-              <a:t>MapBox</a:t>
-            </a:r>
+              <a:t>Initial research into necessary sensor data</a:t>
+            </a:r>
+          </a:p>
+          <a:p>
+            <a:pPr lvl="1"/>
             <a:r>
               <a:rPr lang="en-US" dirty="0"/>
-              <a:t> API calls and capabilities for the team.</a:t>
-            </a:r>
-          </a:p>
-          <a:p>
+              <a:t>Accuracy of sensors</a:t>
+            </a:r>
+          </a:p>
+          <a:p>
+            <a:pPr lvl="1"/>
             <a:r>
               <a:rPr lang="en-US" dirty="0"/>
-              <a:t>Obtain API Key for </a:t>
-            </a:r>
-            <a:r>
-              <a:rPr lang="en-US" dirty="0" err="1"/>
-              <a:t>MapBox</a:t>
-            </a:r>
+              <a:t>What data do we need to return?</a:t>
+            </a:r>
+          </a:p>
+          <a:p>
             <a:r>
               <a:rPr lang="en-US" dirty="0"/>
-              <a:t>.</a:t>
-            </a:r>
-          </a:p>
-          <a:p>
-            <a:r>
-              <a:rPr lang="en-US" dirty="0"/>
-              <a:t>Develop module to read sensors on Android device</a:t>
-            </a:r>
-          </a:p>
-          <a:p>
-            <a:endParaRPr lang="en-US" dirty="0"/>
+              <a:t>Additional Design Work</a:t>
+            </a:r>
           </a:p>
         </p:txBody>
       </p:sp>
@@ -8599,7 +10248,7 @@
           <p:cNvPr id="4" name="Slide Number Placeholder 3">
             <a:extLst>
               <a:ext uri="{FF2B5EF4-FFF2-40B4-BE49-F238E27FC236}">
-                <a16:creationId xmlns:a16="http://schemas.microsoft.com/office/drawing/2014/main" id="{7DB99A5F-00D7-4971-A7FF-A69FAA2A03B7}"/>
+                <a16:creationId xmlns:a16="http://schemas.microsoft.com/office/drawing/2014/main" id="{68400699-93C1-43CE-9C6D-F2E00C8FCA2F}"/>
               </a:ext>
             </a:extLst>
           </p:cNvPr>
@@ -8627,7 +10276,7 @@
     </p:spTree>
     <p:extLst>
       <p:ext uri="{BB962C8B-B14F-4D97-AF65-F5344CB8AC3E}">
-        <p14:creationId xmlns:p14="http://schemas.microsoft.com/office/powerpoint/2010/main" val="2752878232"/>
+        <p14:creationId xmlns:p14="http://schemas.microsoft.com/office/powerpoint/2010/main" val="2639758700"/>
       </p:ext>
     </p:extLst>
   </p:cSld>
@@ -8659,7 +10308,7 @@
           <p:cNvPr id="2" name="Title 1">
             <a:extLst>
               <a:ext uri="{FF2B5EF4-FFF2-40B4-BE49-F238E27FC236}">
-                <a16:creationId xmlns:a16="http://schemas.microsoft.com/office/drawing/2014/main" id="{B42A0C66-3F52-409A-9CE7-5570CF118EC1}"/>
+                <a16:creationId xmlns:a16="http://schemas.microsoft.com/office/drawing/2014/main" id="{97A51132-5F7C-4458-A7CA-40C03DC63E1A}"/>
               </a:ext>
             </a:extLst>
           </p:cNvPr>
@@ -8695,7 +10344,7 @@
           <p:cNvPr id="3" name="Content Placeholder 2">
             <a:extLst>
               <a:ext uri="{FF2B5EF4-FFF2-40B4-BE49-F238E27FC236}">
-                <a16:creationId xmlns:a16="http://schemas.microsoft.com/office/drawing/2014/main" id="{453B0361-81CA-4B36-98AD-8CDC7D18FD88}"/>
+                <a16:creationId xmlns:a16="http://schemas.microsoft.com/office/drawing/2014/main" id="{AC52C316-830D-462A-8F67-9BA0E80F4A72}"/>
               </a:ext>
             </a:extLst>
           </p:cNvPr>
@@ -8713,32 +10362,29 @@
           <a:p>
             <a:r>
               <a:rPr lang="en-US" dirty="0"/>
-              <a:t>Develop Algorithm</a:t>
+              <a:t>GUI Design to accommodate User Stories, Core Functionality, and possibly scalable to future stretch goals.</a:t>
             </a:r>
           </a:p>
           <a:p>
             <a:pPr lvl="1"/>
             <a:r>
               <a:rPr lang="en-US" dirty="0"/>
-              <a:t>Initial research into necessary sensor data</a:t>
+              <a:t>Mockups</a:t>
             </a:r>
           </a:p>
           <a:p>
             <a:pPr lvl="1"/>
             <a:r>
               <a:rPr lang="en-US" dirty="0"/>
-              <a:t>Accuracy of sensors</a:t>
+              <a:t>Bare-bones implementation</a:t>
             </a:r>
           </a:p>
           <a:p>
             <a:pPr lvl="1"/>
             <a:r>
               <a:rPr lang="en-US" dirty="0"/>
-              <a:t>What data do we need to return?</a:t>
-            </a:r>
-          </a:p>
-          <a:p>
-            <a:endParaRPr lang="en-US" dirty="0"/>
+              <a:t>User Story verification – Does GUI functionality align with User Stories?</a:t>
+            </a:r>
           </a:p>
         </p:txBody>
       </p:sp>
@@ -8747,7 +10393,7 @@
           <p:cNvPr id="4" name="Slide Number Placeholder 3">
             <a:extLst>
               <a:ext uri="{FF2B5EF4-FFF2-40B4-BE49-F238E27FC236}">
-                <a16:creationId xmlns:a16="http://schemas.microsoft.com/office/drawing/2014/main" id="{68400699-93C1-43CE-9C6D-F2E00C8FCA2F}"/>
+                <a16:creationId xmlns:a16="http://schemas.microsoft.com/office/drawing/2014/main" id="{7DC007F5-0198-4CE9-837A-8E4EBDFB3638}"/>
               </a:ext>
             </a:extLst>
           </p:cNvPr>
@@ -8775,7 +10421,431 @@
     </p:spTree>
     <p:extLst>
       <p:ext uri="{BB962C8B-B14F-4D97-AF65-F5344CB8AC3E}">
-        <p14:creationId xmlns:p14="http://schemas.microsoft.com/office/powerpoint/2010/main" val="2639758700"/>
+        <p14:creationId xmlns:p14="http://schemas.microsoft.com/office/powerpoint/2010/main" val="2483174827"/>
+      </p:ext>
+    </p:extLst>
+  </p:cSld>
+  <p:clrMapOvr>
+    <a:masterClrMapping/>
+  </p:clrMapOvr>
+</p:sld>
+</file>
+
+<file path=ppt/slides/slide7.xml><?xml version="1.0" encoding="utf-8"?>
+<p:sld xmlns:a="http://schemas.openxmlformats.org/drawingml/2006/main" xmlns:r="http://schemas.openxmlformats.org/officeDocument/2006/relationships" xmlns:p="http://schemas.openxmlformats.org/presentationml/2006/main">
+  <p:cSld>
+    <p:spTree>
+      <p:nvGrpSpPr>
+        <p:cNvPr id="1" name=""/>
+        <p:cNvGrpSpPr/>
+        <p:nvPr/>
+      </p:nvGrpSpPr>
+      <p:grpSpPr>
+        <a:xfrm>
+          <a:off x="0" y="0"/>
+          <a:ext cx="0" cy="0"/>
+          <a:chOff x="0" y="0"/>
+          <a:chExt cx="0" cy="0"/>
+        </a:xfrm>
+      </p:grpSpPr>
+      <p:sp>
+        <p:nvSpPr>
+          <p:cNvPr id="2" name="Title 1">
+            <a:extLst>
+              <a:ext uri="{FF2B5EF4-FFF2-40B4-BE49-F238E27FC236}">
+                <a16:creationId xmlns:a16="http://schemas.microsoft.com/office/drawing/2014/main" id="{8B25CC60-678F-4ABC-A286-B6474D7DA369}"/>
+              </a:ext>
+            </a:extLst>
+          </p:cNvPr>
+          <p:cNvSpPr>
+            <a:spLocks noGrp="1"/>
+          </p:cNvSpPr>
+          <p:nvPr>
+            <p:ph type="title"/>
+          </p:nvPr>
+        </p:nvSpPr>
+        <p:spPr/>
+        <p:txBody>
+          <a:bodyPr/>
+          <a:lstStyle/>
+          <a:p>
+            <a:r>
+              <a:rPr lang="en-US" dirty="0"/>
+              <a:t>Product Backlog (</a:t>
+            </a:r>
+            <a:r>
+              <a:rPr lang="en-US" dirty="0" err="1"/>
+              <a:t>cont</a:t>
+            </a:r>
+            <a:r>
+              <a:rPr lang="en-US" dirty="0"/>
+              <a:t>)</a:t>
+            </a:r>
+          </a:p>
+        </p:txBody>
+      </p:sp>
+      <p:sp>
+        <p:nvSpPr>
+          <p:cNvPr id="3" name="Content Placeholder 2">
+            <a:extLst>
+              <a:ext uri="{FF2B5EF4-FFF2-40B4-BE49-F238E27FC236}">
+                <a16:creationId xmlns:a16="http://schemas.microsoft.com/office/drawing/2014/main" id="{A4A95409-D15F-4ACF-B8E2-B483B69F471C}"/>
+              </a:ext>
+            </a:extLst>
+          </p:cNvPr>
+          <p:cNvSpPr>
+            <a:spLocks noGrp="1"/>
+          </p:cNvSpPr>
+          <p:nvPr>
+            <p:ph idx="1"/>
+          </p:nvPr>
+        </p:nvSpPr>
+        <p:spPr/>
+        <p:txBody>
+          <a:bodyPr/>
+          <a:lstStyle/>
+          <a:p>
+            <a:r>
+              <a:rPr lang="en-US" dirty="0"/>
+              <a:t>Design Entity Relationship Diagram for Database</a:t>
+            </a:r>
+          </a:p>
+          <a:p>
+            <a:r>
+              <a:rPr lang="en-US" dirty="0"/>
+              <a:t>Thorough Investigation of Cloud Database solutions</a:t>
+            </a:r>
+          </a:p>
+          <a:p>
+            <a:r>
+              <a:rPr lang="en-US" dirty="0"/>
+              <a:t>Design a safe and secure local data storage solution.</a:t>
+            </a:r>
+          </a:p>
+          <a:p>
+            <a:pPr lvl="1"/>
+            <a:r>
+              <a:rPr lang="en-US" dirty="0"/>
+              <a:t>Verify Android’s On-Device SQLite capabilities</a:t>
+            </a:r>
+          </a:p>
+          <a:p>
+            <a:pPr lvl="1"/>
+            <a:r>
+              <a:rPr lang="en-US" dirty="0"/>
+              <a:t>Determine what kind of data needs to be stored where</a:t>
+            </a:r>
+          </a:p>
+        </p:txBody>
+      </p:sp>
+      <p:sp>
+        <p:nvSpPr>
+          <p:cNvPr id="4" name="Slide Number Placeholder 3">
+            <a:extLst>
+              <a:ext uri="{FF2B5EF4-FFF2-40B4-BE49-F238E27FC236}">
+                <a16:creationId xmlns:a16="http://schemas.microsoft.com/office/drawing/2014/main" id="{2E8DA2EF-A6B0-4094-B638-5C0BABA0F1E5}"/>
+              </a:ext>
+            </a:extLst>
+          </p:cNvPr>
+          <p:cNvSpPr>
+            <a:spLocks noGrp="1"/>
+          </p:cNvSpPr>
+          <p:nvPr>
+            <p:ph type="sldNum" sz="quarter" idx="12"/>
+          </p:nvPr>
+        </p:nvSpPr>
+        <p:spPr/>
+        <p:txBody>
+          <a:bodyPr/>
+          <a:lstStyle/>
+          <a:p>
+            <a:fld id="{D57F1E4F-1CFF-5643-939E-217C01CDF565}" type="slidenum">
+              <a:rPr lang="en-US" smtClean="0"/>
+              <a:pPr/>
+              <a:t>7</a:t>
+            </a:fld>
+            <a:endParaRPr lang="en-US" dirty="0"/>
+          </a:p>
+        </p:txBody>
+      </p:sp>
+    </p:spTree>
+    <p:extLst>
+      <p:ext uri="{BB962C8B-B14F-4D97-AF65-F5344CB8AC3E}">
+        <p14:creationId xmlns:p14="http://schemas.microsoft.com/office/powerpoint/2010/main" val="483748403"/>
+      </p:ext>
+    </p:extLst>
+  </p:cSld>
+  <p:clrMapOvr>
+    <a:masterClrMapping/>
+  </p:clrMapOvr>
+</p:sld>
+</file>
+
+<file path=ppt/slides/slide8.xml><?xml version="1.0" encoding="utf-8"?>
+<p:sld xmlns:a="http://schemas.openxmlformats.org/drawingml/2006/main" xmlns:r="http://schemas.openxmlformats.org/officeDocument/2006/relationships" xmlns:p="http://schemas.openxmlformats.org/presentationml/2006/main">
+  <p:cSld>
+    <p:spTree>
+      <p:nvGrpSpPr>
+        <p:cNvPr id="1" name=""/>
+        <p:cNvGrpSpPr/>
+        <p:nvPr/>
+      </p:nvGrpSpPr>
+      <p:grpSpPr>
+        <a:xfrm>
+          <a:off x="0" y="0"/>
+          <a:ext cx="0" cy="0"/>
+          <a:chOff x="0" y="0"/>
+          <a:chExt cx="0" cy="0"/>
+        </a:xfrm>
+      </p:grpSpPr>
+      <p:sp>
+        <p:nvSpPr>
+          <p:cNvPr id="2" name="Title 1">
+            <a:extLst>
+              <a:ext uri="{FF2B5EF4-FFF2-40B4-BE49-F238E27FC236}">
+                <a16:creationId xmlns:a16="http://schemas.microsoft.com/office/drawing/2014/main" id="{48FF45B5-D5FA-460B-991C-2FA108E3A3F1}"/>
+              </a:ext>
+            </a:extLst>
+          </p:cNvPr>
+          <p:cNvSpPr>
+            <a:spLocks noGrp="1"/>
+          </p:cNvSpPr>
+          <p:nvPr>
+            <p:ph type="title"/>
+          </p:nvPr>
+        </p:nvSpPr>
+        <p:spPr/>
+        <p:txBody>
+          <a:bodyPr/>
+          <a:lstStyle/>
+          <a:p>
+            <a:r>
+              <a:rPr lang="en-US" dirty="0"/>
+              <a:t>Product Backlog (</a:t>
+            </a:r>
+            <a:r>
+              <a:rPr lang="en-US" dirty="0" err="1"/>
+              <a:t>cont</a:t>
+            </a:r>
+            <a:r>
+              <a:rPr lang="en-US" dirty="0"/>
+              <a:t>)</a:t>
+            </a:r>
+          </a:p>
+        </p:txBody>
+      </p:sp>
+      <p:sp>
+        <p:nvSpPr>
+          <p:cNvPr id="3" name="Content Placeholder 2">
+            <a:extLst>
+              <a:ext uri="{FF2B5EF4-FFF2-40B4-BE49-F238E27FC236}">
+                <a16:creationId xmlns:a16="http://schemas.microsoft.com/office/drawing/2014/main" id="{E78EFE23-8489-47D3-809F-724D797C3D7A}"/>
+              </a:ext>
+            </a:extLst>
+          </p:cNvPr>
+          <p:cNvSpPr>
+            <a:spLocks noGrp="1"/>
+          </p:cNvSpPr>
+          <p:nvPr>
+            <p:ph idx="1"/>
+          </p:nvPr>
+        </p:nvSpPr>
+        <p:spPr/>
+        <p:txBody>
+          <a:bodyPr/>
+          <a:lstStyle/>
+          <a:p>
+            <a:r>
+              <a:rPr lang="en-US" dirty="0"/>
+              <a:t>Research into Google’s Android Authentication system</a:t>
+            </a:r>
+          </a:p>
+          <a:p>
+            <a:r>
+              <a:rPr lang="en-US" dirty="0"/>
+              <a:t>Document and Determine necessary </a:t>
+            </a:r>
+            <a:r>
+              <a:rPr lang="en-US" dirty="0" err="1"/>
+              <a:t>MapBox</a:t>
+            </a:r>
+            <a:r>
+              <a:rPr lang="en-US" dirty="0"/>
+              <a:t> API calls and capabilities for the team.</a:t>
+            </a:r>
+          </a:p>
+          <a:p>
+            <a:r>
+              <a:rPr lang="en-US" dirty="0"/>
+              <a:t>Obtain API Key for </a:t>
+            </a:r>
+            <a:r>
+              <a:rPr lang="en-US" dirty="0" err="1"/>
+              <a:t>MapBox</a:t>
+            </a:r>
+            <a:r>
+              <a:rPr lang="en-US" dirty="0"/>
+              <a:t>.</a:t>
+            </a:r>
+          </a:p>
+          <a:p>
+            <a:r>
+              <a:rPr lang="en-US" dirty="0"/>
+              <a:t>Develop module to read sensors on Android device</a:t>
+            </a:r>
+          </a:p>
+          <a:p>
+            <a:endParaRPr lang="en-US" dirty="0"/>
+          </a:p>
+        </p:txBody>
+      </p:sp>
+      <p:sp>
+        <p:nvSpPr>
+          <p:cNvPr id="4" name="Slide Number Placeholder 3">
+            <a:extLst>
+              <a:ext uri="{FF2B5EF4-FFF2-40B4-BE49-F238E27FC236}">
+                <a16:creationId xmlns:a16="http://schemas.microsoft.com/office/drawing/2014/main" id="{7DB99A5F-00D7-4971-A7FF-A69FAA2A03B7}"/>
+              </a:ext>
+            </a:extLst>
+          </p:cNvPr>
+          <p:cNvSpPr>
+            <a:spLocks noGrp="1"/>
+          </p:cNvSpPr>
+          <p:nvPr>
+            <p:ph type="sldNum" sz="quarter" idx="12"/>
+          </p:nvPr>
+        </p:nvSpPr>
+        <p:spPr/>
+        <p:txBody>
+          <a:bodyPr/>
+          <a:lstStyle/>
+          <a:p>
+            <a:fld id="{D57F1E4F-1CFF-5643-939E-217C01CDF565}" type="slidenum">
+              <a:rPr lang="en-US" smtClean="0"/>
+              <a:pPr/>
+              <a:t>8</a:t>
+            </a:fld>
+            <a:endParaRPr lang="en-US" dirty="0"/>
+          </a:p>
+        </p:txBody>
+      </p:sp>
+    </p:spTree>
+    <p:extLst>
+      <p:ext uri="{BB962C8B-B14F-4D97-AF65-F5344CB8AC3E}">
+        <p14:creationId xmlns:p14="http://schemas.microsoft.com/office/powerpoint/2010/main" val="2752878232"/>
+      </p:ext>
+    </p:extLst>
+  </p:cSld>
+  <p:clrMapOvr>
+    <a:masterClrMapping/>
+  </p:clrMapOvr>
+</p:sld>
+</file>
+
+<file path=ppt/slides/slide9.xml><?xml version="1.0" encoding="utf-8"?>
+<p:sld xmlns:a="http://schemas.openxmlformats.org/drawingml/2006/main" xmlns:r="http://schemas.openxmlformats.org/officeDocument/2006/relationships" xmlns:p="http://schemas.openxmlformats.org/presentationml/2006/main">
+  <p:cSld>
+    <p:spTree>
+      <p:nvGrpSpPr>
+        <p:cNvPr id="1" name=""/>
+        <p:cNvGrpSpPr/>
+        <p:nvPr/>
+      </p:nvGrpSpPr>
+      <p:grpSpPr>
+        <a:xfrm>
+          <a:off x="0" y="0"/>
+          <a:ext cx="0" cy="0"/>
+          <a:chOff x="0" y="0"/>
+          <a:chExt cx="0" cy="0"/>
+        </a:xfrm>
+      </p:grpSpPr>
+      <p:sp>
+        <p:nvSpPr>
+          <p:cNvPr id="2" name="Title 1">
+            <a:extLst>
+              <a:ext uri="{FF2B5EF4-FFF2-40B4-BE49-F238E27FC236}">
+                <a16:creationId xmlns:a16="http://schemas.microsoft.com/office/drawing/2014/main" id="{FAB11C2D-EE05-4A0B-8CD0-4ED2F65CAE8A}"/>
+              </a:ext>
+            </a:extLst>
+          </p:cNvPr>
+          <p:cNvSpPr>
+            <a:spLocks noGrp="1"/>
+          </p:cNvSpPr>
+          <p:nvPr>
+            <p:ph type="title"/>
+          </p:nvPr>
+        </p:nvSpPr>
+        <p:spPr/>
+        <p:txBody>
+          <a:bodyPr/>
+          <a:lstStyle/>
+          <a:p>
+            <a:r>
+              <a:rPr lang="en-US" dirty="0"/>
+              <a:t>Questions?</a:t>
+            </a:r>
+          </a:p>
+        </p:txBody>
+      </p:sp>
+      <p:sp>
+        <p:nvSpPr>
+          <p:cNvPr id="3" name="Content Placeholder 2">
+            <a:extLst>
+              <a:ext uri="{FF2B5EF4-FFF2-40B4-BE49-F238E27FC236}">
+                <a16:creationId xmlns:a16="http://schemas.microsoft.com/office/drawing/2014/main" id="{76C92324-9BA2-4470-8199-AB38945929FA}"/>
+              </a:ext>
+            </a:extLst>
+          </p:cNvPr>
+          <p:cNvSpPr>
+            <a:spLocks noGrp="1"/>
+          </p:cNvSpPr>
+          <p:nvPr>
+            <p:ph idx="1"/>
+          </p:nvPr>
+        </p:nvSpPr>
+        <p:spPr/>
+        <p:txBody>
+          <a:bodyPr/>
+          <a:lstStyle/>
+          <a:p>
+            <a:endParaRPr lang="en-US"/>
+          </a:p>
+        </p:txBody>
+      </p:sp>
+      <p:sp>
+        <p:nvSpPr>
+          <p:cNvPr id="4" name="Slide Number Placeholder 3">
+            <a:extLst>
+              <a:ext uri="{FF2B5EF4-FFF2-40B4-BE49-F238E27FC236}">
+                <a16:creationId xmlns:a16="http://schemas.microsoft.com/office/drawing/2014/main" id="{20D3C6AF-E7A8-4C54-8F7F-CCCED9070700}"/>
+              </a:ext>
+            </a:extLst>
+          </p:cNvPr>
+          <p:cNvSpPr>
+            <a:spLocks noGrp="1"/>
+          </p:cNvSpPr>
+          <p:nvPr>
+            <p:ph type="sldNum" sz="quarter" idx="12"/>
+          </p:nvPr>
+        </p:nvSpPr>
+        <p:spPr/>
+        <p:txBody>
+          <a:bodyPr/>
+          <a:lstStyle/>
+          <a:p>
+            <a:fld id="{D57F1E4F-1CFF-5643-939E-217C01CDF565}" type="slidenum">
+              <a:rPr lang="en-US" smtClean="0"/>
+              <a:pPr/>
+              <a:t>9</a:t>
+            </a:fld>
+            <a:endParaRPr lang="en-US" dirty="0"/>
+          </a:p>
+        </p:txBody>
+      </p:sp>
+    </p:spTree>
+    <p:extLst>
+      <p:ext uri="{BB962C8B-B14F-4D97-AF65-F5344CB8AC3E}">
+        <p14:creationId xmlns:p14="http://schemas.microsoft.com/office/powerpoint/2010/main" val="1758056954"/>
       </p:ext>
     </p:extLst>
   </p:cSld>

</xml_diff>